<commit_message>
Add animation for training explanation
</commit_message>
<xml_diff>
--- a/docs/Anfangspräsentation.pptx
+++ b/docs/Anfangspräsentation.pptx
@@ -360,7 +360,7 @@
           <a:p>
             <a:fld id="{EC7931AB-0497-43F1-8402-A51CA806FA3D}" type="datetimeFigureOut">
               <a:rPr lang="de-DE" smtClean="0"/>
-              <a:t>24.02.2017</a:t>
+              <a:t>25.02.2017</a:t>
             </a:fld>
             <a:endParaRPr lang="de-DE"/>
           </a:p>
@@ -582,7 +582,7 @@
           <a:p>
             <a:fld id="{EC7931AB-0497-43F1-8402-A51CA806FA3D}" type="datetimeFigureOut">
               <a:rPr lang="de-DE" smtClean="0"/>
-              <a:t>24.02.2017</a:t>
+              <a:t>25.02.2017</a:t>
             </a:fld>
             <a:endParaRPr lang="de-DE"/>
           </a:p>
@@ -859,7 +859,7 @@
           <a:p>
             <a:fld id="{EC7931AB-0497-43F1-8402-A51CA806FA3D}" type="datetimeFigureOut">
               <a:rPr lang="de-DE" smtClean="0"/>
-              <a:t>24.02.2017</a:t>
+              <a:t>25.02.2017</a:t>
             </a:fld>
             <a:endParaRPr lang="de-DE"/>
           </a:p>
@@ -1039,7 +1039,7 @@
           <a:p>
             <a:fld id="{EC7931AB-0497-43F1-8402-A51CA806FA3D}" type="datetimeFigureOut">
               <a:rPr lang="de-DE" smtClean="0"/>
-              <a:t>24.02.2017</a:t>
+              <a:t>25.02.2017</a:t>
             </a:fld>
             <a:endParaRPr lang="de-DE"/>
           </a:p>
@@ -1398,7 +1398,7 @@
           <a:p>
             <a:fld id="{EC7931AB-0497-43F1-8402-A51CA806FA3D}" type="datetimeFigureOut">
               <a:rPr lang="de-DE" smtClean="0"/>
-              <a:t>24.02.2017</a:t>
+              <a:t>25.02.2017</a:t>
             </a:fld>
             <a:endParaRPr lang="de-DE"/>
           </a:p>
@@ -1688,7 +1688,7 @@
           <a:p>
             <a:fld id="{EC7931AB-0497-43F1-8402-A51CA806FA3D}" type="datetimeFigureOut">
               <a:rPr lang="de-DE" smtClean="0"/>
-              <a:t>24.02.2017</a:t>
+              <a:t>25.02.2017</a:t>
             </a:fld>
             <a:endParaRPr lang="de-DE"/>
           </a:p>
@@ -2115,7 +2115,7 @@
           <a:p>
             <a:fld id="{EC7931AB-0497-43F1-8402-A51CA806FA3D}" type="datetimeFigureOut">
               <a:rPr lang="de-DE" smtClean="0"/>
-              <a:t>24.02.2017</a:t>
+              <a:t>25.02.2017</a:t>
             </a:fld>
             <a:endParaRPr lang="de-DE"/>
           </a:p>
@@ -2233,7 +2233,7 @@
           <a:p>
             <a:fld id="{EC7931AB-0497-43F1-8402-A51CA806FA3D}" type="datetimeFigureOut">
               <a:rPr lang="de-DE" smtClean="0"/>
-              <a:t>24.02.2017</a:t>
+              <a:t>25.02.2017</a:t>
             </a:fld>
             <a:endParaRPr lang="de-DE"/>
           </a:p>
@@ -2328,7 +2328,7 @@
           <a:p>
             <a:fld id="{EC7931AB-0497-43F1-8402-A51CA806FA3D}" type="datetimeFigureOut">
               <a:rPr lang="de-DE" smtClean="0"/>
-              <a:t>24.02.2017</a:t>
+              <a:t>25.02.2017</a:t>
             </a:fld>
             <a:endParaRPr lang="de-DE"/>
           </a:p>
@@ -2611,7 +2611,7 @@
           <a:p>
             <a:fld id="{EC7931AB-0497-43F1-8402-A51CA806FA3D}" type="datetimeFigureOut">
               <a:rPr lang="de-DE" smtClean="0"/>
-              <a:t>24.02.2017</a:t>
+              <a:t>25.02.2017</a:t>
             </a:fld>
             <a:endParaRPr lang="de-DE"/>
           </a:p>
@@ -2978,7 +2978,7 @@
           <a:p>
             <a:fld id="{EC7931AB-0497-43F1-8402-A51CA806FA3D}" type="datetimeFigureOut">
               <a:rPr lang="de-DE" smtClean="0"/>
-              <a:t>24.02.2017</a:t>
+              <a:t>25.02.2017</a:t>
             </a:fld>
             <a:endParaRPr lang="de-DE"/>
           </a:p>
@@ -3408,7 +3408,7 @@
           <a:p>
             <a:fld id="{EC7931AB-0497-43F1-8402-A51CA806FA3D}" type="datetimeFigureOut">
               <a:rPr lang="de-DE" smtClean="0"/>
-              <a:t>24.02.2017</a:t>
+              <a:t>25.02.2017</a:t>
             </a:fld>
             <a:endParaRPr lang="de-DE"/>
           </a:p>
@@ -4245,36 +4245,6 @@
       </p:sp>
       <p:pic>
         <p:nvPicPr>
-          <p:cNvPr id="10" name="Grafik 9"/>
-          <p:cNvPicPr>
-            <a:picLocks noChangeAspect="1"/>
-          </p:cNvPicPr>
-          <p:nvPr/>
-        </p:nvPicPr>
-        <p:blipFill>
-          <a:blip r:embed="rId4">
-            <a:extLst>
-              <a:ext uri="{28A0092B-C50C-407E-A947-70E740481C1C}">
-                <a14:useLocalDpi xmlns:a14="http://schemas.microsoft.com/office/drawing/2010/main" val="0"/>
-              </a:ext>
-            </a:extLst>
-          </a:blip>
-          <a:stretch>
-            <a:fillRect/>
-          </a:stretch>
-        </p:blipFill>
-        <p:spPr>
-          <a:xfrm>
-            <a:off x="9719463" y="4600801"/>
-            <a:ext cx="1862937" cy="1800000"/>
-          </a:xfrm>
-          <a:prstGeom prst="rect">
-            <a:avLst/>
-          </a:prstGeom>
-        </p:spPr>
-      </p:pic>
-      <p:pic>
-        <p:nvPicPr>
           <p:cNvPr id="16" name="Grafik 15"/>
           <p:cNvPicPr>
             <a:picLocks noChangeAspect="1"/>
@@ -4417,6 +4387,36 @@
           </a:p>
         </p:txBody>
       </p:sp>
+      <p:pic>
+        <p:nvPicPr>
+          <p:cNvPr id="21" name="Grafik 20"/>
+          <p:cNvPicPr>
+            <a:picLocks noChangeAspect="1"/>
+          </p:cNvPicPr>
+          <p:nvPr/>
+        </p:nvPicPr>
+        <p:blipFill>
+          <a:blip r:embed="rId4">
+            <a:extLst>
+              <a:ext uri="{28A0092B-C50C-407E-A947-70E740481C1C}">
+                <a14:useLocalDpi xmlns:a14="http://schemas.microsoft.com/office/drawing/2010/main" val="0"/>
+              </a:ext>
+            </a:extLst>
+          </a:blip>
+          <a:stretch>
+            <a:fillRect/>
+          </a:stretch>
+        </p:blipFill>
+        <p:spPr>
+          <a:xfrm>
+            <a:off x="9719462" y="1775192"/>
+            <a:ext cx="1862937" cy="1800000"/>
+          </a:xfrm>
+          <a:prstGeom prst="rect">
+            <a:avLst/>
+          </a:prstGeom>
+        </p:spPr>
+      </p:pic>
     </p:spTree>
     <p:extLst>
       <p:ext uri="{BB962C8B-B14F-4D97-AF65-F5344CB8AC3E}">
@@ -4427,6 +4427,604 @@
   <p:clrMapOvr>
     <a:masterClrMapping/>
   </p:clrMapOvr>
+  <p:timing>
+    <p:tnLst>
+      <p:par>
+        <p:cTn id="1" dur="indefinite" restart="never" nodeType="tmRoot">
+          <p:childTnLst>
+            <p:seq concurrent="1" nextAc="seek">
+              <p:cTn id="2" dur="indefinite" nodeType="mainSeq">
+                <p:childTnLst>
+                  <p:par>
+                    <p:cTn id="3" fill="hold">
+                      <p:stCondLst>
+                        <p:cond delay="indefinite"/>
+                      </p:stCondLst>
+                      <p:childTnLst>
+                        <p:par>
+                          <p:cTn id="4" fill="hold">
+                            <p:stCondLst>
+                              <p:cond delay="0"/>
+                            </p:stCondLst>
+                            <p:childTnLst>
+                              <p:par>
+                                <p:cTn id="5" presetID="10" presetClass="entr" presetSubtype="0" fill="hold" nodeType="clickEffect">
+                                  <p:stCondLst>
+                                    <p:cond delay="0"/>
+                                  </p:stCondLst>
+                                  <p:childTnLst>
+                                    <p:set>
+                                      <p:cBhvr>
+                                        <p:cTn id="6" dur="1" fill="hold">
+                                          <p:stCondLst>
+                                            <p:cond delay="0"/>
+                                          </p:stCondLst>
+                                        </p:cTn>
+                                        <p:tgtEl>
+                                          <p:spTgt spid="4"/>
+                                        </p:tgtEl>
+                                        <p:attrNameLst>
+                                          <p:attrName>style.visibility</p:attrName>
+                                        </p:attrNameLst>
+                                      </p:cBhvr>
+                                      <p:to>
+                                        <p:strVal val="visible"/>
+                                      </p:to>
+                                    </p:set>
+                                    <p:animEffect transition="in" filter="fade">
+                                      <p:cBhvr>
+                                        <p:cTn id="7" dur="500"/>
+                                        <p:tgtEl>
+                                          <p:spTgt spid="4"/>
+                                        </p:tgtEl>
+                                      </p:cBhvr>
+                                    </p:animEffect>
+                                  </p:childTnLst>
+                                </p:cTn>
+                              </p:par>
+                              <p:par>
+                                <p:cTn id="8" presetID="10" presetClass="entr" presetSubtype="0" fill="hold" nodeType="withEffect">
+                                  <p:stCondLst>
+                                    <p:cond delay="0"/>
+                                  </p:stCondLst>
+                                  <p:childTnLst>
+                                    <p:set>
+                                      <p:cBhvr>
+                                        <p:cTn id="9" dur="1" fill="hold">
+                                          <p:stCondLst>
+                                            <p:cond delay="0"/>
+                                          </p:stCondLst>
+                                        </p:cTn>
+                                        <p:tgtEl>
+                                          <p:spTgt spid="5"/>
+                                        </p:tgtEl>
+                                        <p:attrNameLst>
+                                          <p:attrName>style.visibility</p:attrName>
+                                        </p:attrNameLst>
+                                      </p:cBhvr>
+                                      <p:to>
+                                        <p:strVal val="visible"/>
+                                      </p:to>
+                                    </p:set>
+                                    <p:animEffect transition="in" filter="fade">
+                                      <p:cBhvr>
+                                        <p:cTn id="10" dur="500"/>
+                                        <p:tgtEl>
+                                          <p:spTgt spid="5"/>
+                                        </p:tgtEl>
+                                      </p:cBhvr>
+                                    </p:animEffect>
+                                  </p:childTnLst>
+                                </p:cTn>
+                              </p:par>
+                            </p:childTnLst>
+                          </p:cTn>
+                        </p:par>
+                      </p:childTnLst>
+                    </p:cTn>
+                  </p:par>
+                  <p:par>
+                    <p:cTn id="11" fill="hold">
+                      <p:stCondLst>
+                        <p:cond delay="indefinite"/>
+                      </p:stCondLst>
+                      <p:childTnLst>
+                        <p:par>
+                          <p:cTn id="12" fill="hold">
+                            <p:stCondLst>
+                              <p:cond delay="0"/>
+                            </p:stCondLst>
+                            <p:childTnLst>
+                              <p:par>
+                                <p:cTn id="13" presetID="10" presetClass="entr" presetSubtype="0" fill="hold" grpId="0" nodeType="clickEffect">
+                                  <p:stCondLst>
+                                    <p:cond delay="0"/>
+                                  </p:stCondLst>
+                                  <p:childTnLst>
+                                    <p:set>
+                                      <p:cBhvr>
+                                        <p:cTn id="14" dur="1" fill="hold">
+                                          <p:stCondLst>
+                                            <p:cond delay="0"/>
+                                          </p:stCondLst>
+                                        </p:cTn>
+                                        <p:tgtEl>
+                                          <p:spTgt spid="7"/>
+                                        </p:tgtEl>
+                                        <p:attrNameLst>
+                                          <p:attrName>style.visibility</p:attrName>
+                                        </p:attrNameLst>
+                                      </p:cBhvr>
+                                      <p:to>
+                                        <p:strVal val="visible"/>
+                                      </p:to>
+                                    </p:set>
+                                    <p:animEffect transition="in" filter="fade">
+                                      <p:cBhvr>
+                                        <p:cTn id="15" dur="500"/>
+                                        <p:tgtEl>
+                                          <p:spTgt spid="7"/>
+                                        </p:tgtEl>
+                                      </p:cBhvr>
+                                    </p:animEffect>
+                                  </p:childTnLst>
+                                </p:cTn>
+                              </p:par>
+                            </p:childTnLst>
+                          </p:cTn>
+                        </p:par>
+                      </p:childTnLst>
+                    </p:cTn>
+                  </p:par>
+                  <p:par>
+                    <p:cTn id="16" fill="hold">
+                      <p:stCondLst>
+                        <p:cond delay="indefinite"/>
+                      </p:stCondLst>
+                      <p:childTnLst>
+                        <p:par>
+                          <p:cTn id="17" fill="hold">
+                            <p:stCondLst>
+                              <p:cond delay="0"/>
+                            </p:stCondLst>
+                            <p:childTnLst>
+                              <p:par>
+                                <p:cTn id="18" presetID="10" presetClass="entr" presetSubtype="0" fill="hold" grpId="0" nodeType="clickEffect">
+                                  <p:stCondLst>
+                                    <p:cond delay="0"/>
+                                  </p:stCondLst>
+                                  <p:childTnLst>
+                                    <p:set>
+                                      <p:cBhvr>
+                                        <p:cTn id="19" dur="1" fill="hold">
+                                          <p:stCondLst>
+                                            <p:cond delay="0"/>
+                                          </p:stCondLst>
+                                        </p:cTn>
+                                        <p:tgtEl>
+                                          <p:spTgt spid="8"/>
+                                        </p:tgtEl>
+                                        <p:attrNameLst>
+                                          <p:attrName>style.visibility</p:attrName>
+                                        </p:attrNameLst>
+                                      </p:cBhvr>
+                                      <p:to>
+                                        <p:strVal val="visible"/>
+                                      </p:to>
+                                    </p:set>
+                                    <p:animEffect transition="in" filter="fade">
+                                      <p:cBhvr>
+                                        <p:cTn id="20" dur="500"/>
+                                        <p:tgtEl>
+                                          <p:spTgt spid="8"/>
+                                        </p:tgtEl>
+                                      </p:cBhvr>
+                                    </p:animEffect>
+                                  </p:childTnLst>
+                                </p:cTn>
+                              </p:par>
+                            </p:childTnLst>
+                          </p:cTn>
+                        </p:par>
+                      </p:childTnLst>
+                    </p:cTn>
+                  </p:par>
+                  <p:par>
+                    <p:cTn id="21" fill="hold">
+                      <p:stCondLst>
+                        <p:cond delay="indefinite"/>
+                      </p:stCondLst>
+                      <p:childTnLst>
+                        <p:par>
+                          <p:cTn id="22" fill="hold">
+                            <p:stCondLst>
+                              <p:cond delay="0"/>
+                            </p:stCondLst>
+                            <p:childTnLst>
+                              <p:par>
+                                <p:cTn id="23" presetID="10" presetClass="entr" presetSubtype="0" fill="hold" grpId="0" nodeType="clickEffect">
+                                  <p:stCondLst>
+                                    <p:cond delay="0"/>
+                                  </p:stCondLst>
+                                  <p:childTnLst>
+                                    <p:set>
+                                      <p:cBhvr>
+                                        <p:cTn id="24" dur="1" fill="hold">
+                                          <p:stCondLst>
+                                            <p:cond delay="0"/>
+                                          </p:stCondLst>
+                                        </p:cTn>
+                                        <p:tgtEl>
+                                          <p:spTgt spid="9"/>
+                                        </p:tgtEl>
+                                        <p:attrNameLst>
+                                          <p:attrName>style.visibility</p:attrName>
+                                        </p:attrNameLst>
+                                      </p:cBhvr>
+                                      <p:to>
+                                        <p:strVal val="visible"/>
+                                      </p:to>
+                                    </p:set>
+                                    <p:animEffect transition="in" filter="fade">
+                                      <p:cBhvr>
+                                        <p:cTn id="25" dur="500"/>
+                                        <p:tgtEl>
+                                          <p:spTgt spid="9"/>
+                                        </p:tgtEl>
+                                      </p:cBhvr>
+                                    </p:animEffect>
+                                  </p:childTnLst>
+                                </p:cTn>
+                              </p:par>
+                              <p:par>
+                                <p:cTn id="26" presetID="10" presetClass="entr" presetSubtype="0" fill="hold" nodeType="withEffect">
+                                  <p:stCondLst>
+                                    <p:cond delay="0"/>
+                                  </p:stCondLst>
+                                  <p:childTnLst>
+                                    <p:set>
+                                      <p:cBhvr>
+                                        <p:cTn id="27" dur="1" fill="hold">
+                                          <p:stCondLst>
+                                            <p:cond delay="0"/>
+                                          </p:stCondLst>
+                                        </p:cTn>
+                                        <p:tgtEl>
+                                          <p:spTgt spid="6"/>
+                                        </p:tgtEl>
+                                        <p:attrNameLst>
+                                          <p:attrName>style.visibility</p:attrName>
+                                        </p:attrNameLst>
+                                      </p:cBhvr>
+                                      <p:to>
+                                        <p:strVal val="visible"/>
+                                      </p:to>
+                                    </p:set>
+                                    <p:animEffect transition="in" filter="fade">
+                                      <p:cBhvr>
+                                        <p:cTn id="28" dur="500"/>
+                                        <p:tgtEl>
+                                          <p:spTgt spid="6"/>
+                                        </p:tgtEl>
+                                      </p:cBhvr>
+                                    </p:animEffect>
+                                  </p:childTnLst>
+                                </p:cTn>
+                              </p:par>
+                            </p:childTnLst>
+                          </p:cTn>
+                        </p:par>
+                      </p:childTnLst>
+                    </p:cTn>
+                  </p:par>
+                  <p:par>
+                    <p:cTn id="29" fill="hold">
+                      <p:stCondLst>
+                        <p:cond delay="indefinite"/>
+                      </p:stCondLst>
+                      <p:childTnLst>
+                        <p:par>
+                          <p:cTn id="30" fill="hold">
+                            <p:stCondLst>
+                              <p:cond delay="0"/>
+                            </p:stCondLst>
+                            <p:childTnLst>
+                              <p:par>
+                                <p:cTn id="31" presetID="10" presetClass="entr" presetSubtype="0" fill="hold" nodeType="clickEffect">
+                                  <p:stCondLst>
+                                    <p:cond delay="0"/>
+                                  </p:stCondLst>
+                                  <p:childTnLst>
+                                    <p:set>
+                                      <p:cBhvr>
+                                        <p:cTn id="32" dur="1" fill="hold">
+                                          <p:stCondLst>
+                                            <p:cond delay="0"/>
+                                          </p:stCondLst>
+                                        </p:cTn>
+                                        <p:tgtEl>
+                                          <p:spTgt spid="21"/>
+                                        </p:tgtEl>
+                                        <p:attrNameLst>
+                                          <p:attrName>style.visibility</p:attrName>
+                                        </p:attrNameLst>
+                                      </p:cBhvr>
+                                      <p:to>
+                                        <p:strVal val="visible"/>
+                                      </p:to>
+                                    </p:set>
+                                    <p:animEffect transition="in" filter="fade">
+                                      <p:cBhvr>
+                                        <p:cTn id="33" dur="10"/>
+                                        <p:tgtEl>
+                                          <p:spTgt spid="21"/>
+                                        </p:tgtEl>
+                                      </p:cBhvr>
+                                    </p:animEffect>
+                                  </p:childTnLst>
+                                </p:cTn>
+                              </p:par>
+                            </p:childTnLst>
+                          </p:cTn>
+                        </p:par>
+                        <p:par>
+                          <p:cTn id="34" fill="hold">
+                            <p:stCondLst>
+                              <p:cond delay="10"/>
+                            </p:stCondLst>
+                            <p:childTnLst>
+                              <p:par>
+                                <p:cTn id="35" presetID="42" presetClass="path" presetSubtype="0" accel="50000" decel="50000" fill="hold" nodeType="afterEffect">
+                                  <p:stCondLst>
+                                    <p:cond delay="0"/>
+                                  </p:stCondLst>
+                                  <p:childTnLst>
+                                    <p:animMotion origin="layout" path="M 2.29167E-6 3.7037E-6 L 2.29167E-6 0.41412 " pathEditMode="relative" rAng="0" ptsTypes="AA">
+                                      <p:cBhvr>
+                                        <p:cTn id="36" dur="2000" fill="hold"/>
+                                        <p:tgtEl>
+                                          <p:spTgt spid="21"/>
+                                        </p:tgtEl>
+                                        <p:attrNameLst>
+                                          <p:attrName>ppt_x</p:attrName>
+                                          <p:attrName>ppt_y</p:attrName>
+                                        </p:attrNameLst>
+                                      </p:cBhvr>
+                                      <p:rCtr x="0" y="20694"/>
+                                    </p:animMotion>
+                                  </p:childTnLst>
+                                </p:cTn>
+                              </p:par>
+                            </p:childTnLst>
+                          </p:cTn>
+                        </p:par>
+                      </p:childTnLst>
+                    </p:cTn>
+                  </p:par>
+                  <p:par>
+                    <p:cTn id="37" fill="hold">
+                      <p:stCondLst>
+                        <p:cond delay="indefinite"/>
+                      </p:stCondLst>
+                      <p:childTnLst>
+                        <p:par>
+                          <p:cTn id="38" fill="hold">
+                            <p:stCondLst>
+                              <p:cond delay="0"/>
+                            </p:stCondLst>
+                            <p:childTnLst>
+                              <p:par>
+                                <p:cTn id="39" presetID="10" presetClass="entr" presetSubtype="0" fill="hold" grpId="0" nodeType="clickEffect">
+                                  <p:stCondLst>
+                                    <p:cond delay="0"/>
+                                  </p:stCondLst>
+                                  <p:childTnLst>
+                                    <p:set>
+                                      <p:cBhvr>
+                                        <p:cTn id="40" dur="1" fill="hold">
+                                          <p:stCondLst>
+                                            <p:cond delay="0"/>
+                                          </p:stCondLst>
+                                        </p:cTn>
+                                        <p:tgtEl>
+                                          <p:spTgt spid="18"/>
+                                        </p:tgtEl>
+                                        <p:attrNameLst>
+                                          <p:attrName>style.visibility</p:attrName>
+                                        </p:attrNameLst>
+                                      </p:cBhvr>
+                                      <p:to>
+                                        <p:strVal val="visible"/>
+                                      </p:to>
+                                    </p:set>
+                                    <p:animEffect transition="in" filter="fade">
+                                      <p:cBhvr>
+                                        <p:cTn id="41" dur="500"/>
+                                        <p:tgtEl>
+                                          <p:spTgt spid="18"/>
+                                        </p:tgtEl>
+                                      </p:cBhvr>
+                                    </p:animEffect>
+                                  </p:childTnLst>
+                                </p:cTn>
+                              </p:par>
+                              <p:par>
+                                <p:cTn id="42" presetID="10" presetClass="entr" presetSubtype="0" fill="hold" grpId="0" nodeType="withEffect">
+                                  <p:stCondLst>
+                                    <p:cond delay="0"/>
+                                  </p:stCondLst>
+                                  <p:childTnLst>
+                                    <p:set>
+                                      <p:cBhvr>
+                                        <p:cTn id="43" dur="1" fill="hold">
+                                          <p:stCondLst>
+                                            <p:cond delay="0"/>
+                                          </p:stCondLst>
+                                        </p:cTn>
+                                        <p:tgtEl>
+                                          <p:spTgt spid="17"/>
+                                        </p:tgtEl>
+                                        <p:attrNameLst>
+                                          <p:attrName>style.visibility</p:attrName>
+                                        </p:attrNameLst>
+                                      </p:cBhvr>
+                                      <p:to>
+                                        <p:strVal val="visible"/>
+                                      </p:to>
+                                    </p:set>
+                                    <p:animEffect transition="in" filter="fade">
+                                      <p:cBhvr>
+                                        <p:cTn id="44" dur="500"/>
+                                        <p:tgtEl>
+                                          <p:spTgt spid="17"/>
+                                        </p:tgtEl>
+                                      </p:cBhvr>
+                                    </p:animEffect>
+                                  </p:childTnLst>
+                                </p:cTn>
+                              </p:par>
+                            </p:childTnLst>
+                          </p:cTn>
+                        </p:par>
+                      </p:childTnLst>
+                    </p:cTn>
+                  </p:par>
+                  <p:par>
+                    <p:cTn id="45" fill="hold">
+                      <p:stCondLst>
+                        <p:cond delay="indefinite"/>
+                      </p:stCondLst>
+                      <p:childTnLst>
+                        <p:par>
+                          <p:cTn id="46" fill="hold">
+                            <p:stCondLst>
+                              <p:cond delay="0"/>
+                            </p:stCondLst>
+                            <p:childTnLst>
+                              <p:par>
+                                <p:cTn id="47" presetID="10" presetClass="entr" presetSubtype="0" fill="hold" nodeType="clickEffect">
+                                  <p:stCondLst>
+                                    <p:cond delay="0"/>
+                                  </p:stCondLst>
+                                  <p:childTnLst>
+                                    <p:set>
+                                      <p:cBhvr>
+                                        <p:cTn id="48" dur="1" fill="hold">
+                                          <p:stCondLst>
+                                            <p:cond delay="0"/>
+                                          </p:stCondLst>
+                                        </p:cTn>
+                                        <p:tgtEl>
+                                          <p:spTgt spid="16"/>
+                                        </p:tgtEl>
+                                        <p:attrNameLst>
+                                          <p:attrName>style.visibility</p:attrName>
+                                        </p:attrNameLst>
+                                      </p:cBhvr>
+                                      <p:to>
+                                        <p:strVal val="visible"/>
+                                      </p:to>
+                                    </p:set>
+                                    <p:animEffect transition="in" filter="fade">
+                                      <p:cBhvr>
+                                        <p:cTn id="49" dur="500"/>
+                                        <p:tgtEl>
+                                          <p:spTgt spid="16"/>
+                                        </p:tgtEl>
+                                      </p:cBhvr>
+                                    </p:animEffect>
+                                  </p:childTnLst>
+                                </p:cTn>
+                              </p:par>
+                            </p:childTnLst>
+                          </p:cTn>
+                        </p:par>
+                      </p:childTnLst>
+                    </p:cTn>
+                  </p:par>
+                  <p:par>
+                    <p:cTn id="50" fill="hold">
+                      <p:stCondLst>
+                        <p:cond delay="indefinite"/>
+                      </p:stCondLst>
+                      <p:childTnLst>
+                        <p:par>
+                          <p:cTn id="51" fill="hold">
+                            <p:stCondLst>
+                              <p:cond delay="0"/>
+                            </p:stCondLst>
+                            <p:childTnLst>
+                              <p:par>
+                                <p:cTn id="52" presetID="10" presetClass="entr" presetSubtype="0" fill="hold" grpId="0" nodeType="clickEffect">
+                                  <p:stCondLst>
+                                    <p:cond delay="0"/>
+                                  </p:stCondLst>
+                                  <p:childTnLst>
+                                    <p:set>
+                                      <p:cBhvr>
+                                        <p:cTn id="53" dur="1" fill="hold">
+                                          <p:stCondLst>
+                                            <p:cond delay="0"/>
+                                          </p:stCondLst>
+                                        </p:cTn>
+                                        <p:tgtEl>
+                                          <p:spTgt spid="19"/>
+                                        </p:tgtEl>
+                                        <p:attrNameLst>
+                                          <p:attrName>style.visibility</p:attrName>
+                                        </p:attrNameLst>
+                                      </p:cBhvr>
+                                      <p:to>
+                                        <p:strVal val="visible"/>
+                                      </p:to>
+                                    </p:set>
+                                    <p:animEffect transition="in" filter="fade">
+                                      <p:cBhvr>
+                                        <p:cTn id="54" dur="500"/>
+                                        <p:tgtEl>
+                                          <p:spTgt spid="19"/>
+                                        </p:tgtEl>
+                                      </p:cBhvr>
+                                    </p:animEffect>
+                                  </p:childTnLst>
+                                </p:cTn>
+                              </p:par>
+                            </p:childTnLst>
+                          </p:cTn>
+                        </p:par>
+                      </p:childTnLst>
+                    </p:cTn>
+                  </p:par>
+                </p:childTnLst>
+              </p:cTn>
+              <p:prevCondLst>
+                <p:cond evt="onPrev" delay="0">
+                  <p:tgtEl>
+                    <p:sldTgt/>
+                  </p:tgtEl>
+                </p:cond>
+              </p:prevCondLst>
+              <p:nextCondLst>
+                <p:cond evt="onNext" delay="0">
+                  <p:tgtEl>
+                    <p:sldTgt/>
+                  </p:tgtEl>
+                </p:cond>
+              </p:nextCondLst>
+            </p:seq>
+          </p:childTnLst>
+        </p:cTn>
+      </p:par>
+    </p:tnLst>
+    <p:bldLst>
+      <p:bldP spid="7" grpId="0" animBg="1"/>
+      <p:bldP spid="8" grpId="0" animBg="1"/>
+      <p:bldP spid="9" grpId="0" animBg="1"/>
+      <p:bldP spid="17" grpId="0" animBg="1"/>
+      <p:bldP spid="18" grpId="0" animBg="1"/>
+      <p:bldP spid="19" grpId="0" animBg="1"/>
+    </p:bldLst>
+  </p:timing>
 </p:sld>
 </file>
 

</xml_diff>

<commit_message>
Add text to images
</commit_message>
<xml_diff>
--- a/docs/Anfangspräsentation.pptx
+++ b/docs/Anfangspräsentation.pptx
@@ -9,6 +9,7 @@
     <p:sldId id="257" r:id="rId3"/>
     <p:sldId id="259" r:id="rId4"/>
     <p:sldId id="260" r:id="rId5"/>
+    <p:sldId id="261" r:id="rId6"/>
   </p:sldIdLst>
   <p:sldSz cx="12192000" cy="6858000"/>
   <p:notesSz cx="6858000" cy="9144000"/>
@@ -3832,9 +3833,13 @@
         </p:nvSpPr>
         <p:spPr/>
         <p:txBody>
-          <a:bodyPr/>
-          <a:lstStyle/>
-          <a:p>
+          <a:bodyPr anchor="ctr"/>
+          <a:lstStyle/>
+          <a:p>
+            <a:r>
+              <a:rPr lang="de-DE" dirty="0" err="1"/>
+              <a:t>Deeplearning</a:t>
+            </a:r>
             <a:endParaRPr lang="de-DE" dirty="0"/>
           </a:p>
         </p:txBody>
@@ -3849,12 +3854,20 @@
             <p:ph type="subTitle" idx="1"/>
           </p:nvPr>
         </p:nvSpPr>
-        <p:spPr/>
-        <p:txBody>
-          <a:bodyPr/>
-          <a:lstStyle/>
-          <a:p>
-            <a:endParaRPr lang="de-DE"/>
+        <p:spPr>
+          <a:xfrm>
+            <a:off x="914400" y="5245769"/>
+            <a:ext cx="10769600" cy="1499616"/>
+          </a:xfrm>
+        </p:spPr>
+        <p:txBody>
+          <a:bodyPr anchor="ctr"/>
+          <a:lstStyle/>
+          <a:p>
+            <a:r>
+              <a:rPr lang="de-DE" dirty="0"/>
+              <a:t>Sebastian Mischke</a:t>
+            </a:r>
           </a:p>
         </p:txBody>
       </p:sp>
@@ -4149,18 +4162,20 @@
           <a:p>
             <a:pPr algn="ctr"/>
             <a:r>
-              <a:rPr lang="de-DE" dirty="0" err="1"/>
+              <a:rPr lang="de-DE" sz="4900" dirty="0">
+                <a:latin typeface="Agency FB" panose="020B0503020202020204" pitchFamily="34" charset="0"/>
+              </a:rPr>
               <a:t>Neural</a:t>
             </a:r>
-            <a:endParaRPr lang="de-DE" dirty="0"/>
           </a:p>
           <a:p>
             <a:pPr algn="ctr"/>
             <a:r>
-              <a:rPr lang="de-DE" dirty="0" err="1"/>
+              <a:rPr lang="de-DE" sz="4900" dirty="0">
+                <a:latin typeface="Agency FB" panose="020B0503020202020204" pitchFamily="34" charset="0"/>
+              </a:rPr>
               <a:t>network</a:t>
             </a:r>
-            <a:endParaRPr lang="de-DE" dirty="0"/>
           </a:p>
         </p:txBody>
       </p:sp>
@@ -4418,6 +4433,194 @@
           </a:prstGeom>
         </p:spPr>
       </p:pic>
+      <p:sp>
+        <p:nvSpPr>
+          <p:cNvPr id="15" name="Rechteck 14"/>
+          <p:cNvSpPr/>
+          <p:nvPr/>
+        </p:nvSpPr>
+        <p:spPr>
+          <a:xfrm>
+            <a:off x="609599" y="2136583"/>
+            <a:ext cx="1863379" cy="1077218"/>
+          </a:xfrm>
+          <a:prstGeom prst="rect">
+            <a:avLst/>
+          </a:prstGeom>
+          <a:noFill/>
+        </p:spPr>
+        <p:txBody>
+          <a:bodyPr wrap="square" lIns="91440" tIns="45720" rIns="91440" bIns="45720" anchor="ctr">
+            <a:spAutoFit/>
+          </a:bodyPr>
+          <a:lstStyle/>
+          <a:p>
+            <a:pPr algn="ctr"/>
+            <a:r>
+              <a:rPr lang="de-DE" sz="6300" dirty="0">
+                <a:ln w="0">
+                  <a:solidFill>
+                    <a:schemeClr val="tx1"/>
+                  </a:solidFill>
+                </a:ln>
+                <a:solidFill>
+                  <a:schemeClr val="accent2"/>
+                </a:solidFill>
+                <a:effectLst>
+                  <a:outerShdw blurRad="38100" dist="19050" dir="2700000" algn="tl" rotWithShape="0">
+                    <a:schemeClr val="dk1">
+                      <a:alpha val="40000"/>
+                    </a:schemeClr>
+                  </a:outerShdw>
+                </a:effectLst>
+                <a:latin typeface="Agency FB" panose="020B0503020202020204" pitchFamily="34" charset="0"/>
+              </a:rPr>
+              <a:t>Input</a:t>
+            </a:r>
+          </a:p>
+        </p:txBody>
+      </p:sp>
+      <p:sp>
+        <p:nvSpPr>
+          <p:cNvPr id="20" name="Rechteck 19"/>
+          <p:cNvSpPr/>
+          <p:nvPr/>
+        </p:nvSpPr>
+        <p:spPr>
+          <a:xfrm>
+            <a:off x="604286" y="4962192"/>
+            <a:ext cx="1863379" cy="1077218"/>
+          </a:xfrm>
+          <a:prstGeom prst="rect">
+            <a:avLst/>
+          </a:prstGeom>
+          <a:noFill/>
+        </p:spPr>
+        <p:txBody>
+          <a:bodyPr wrap="square" lIns="91440" tIns="45720" rIns="91440" bIns="45720" anchor="ctr">
+            <a:spAutoFit/>
+          </a:bodyPr>
+          <a:lstStyle/>
+          <a:p>
+            <a:pPr algn="ctr"/>
+            <a:r>
+              <a:rPr lang="de-DE" sz="6300" dirty="0">
+                <a:ln w="0">
+                  <a:solidFill>
+                    <a:schemeClr val="tx1"/>
+                  </a:solidFill>
+                </a:ln>
+                <a:solidFill>
+                  <a:schemeClr val="accent2"/>
+                </a:solidFill>
+                <a:effectLst>
+                  <a:outerShdw blurRad="38100" dist="19050" dir="2700000" algn="tl" rotWithShape="0">
+                    <a:schemeClr val="dk1">
+                      <a:alpha val="40000"/>
+                    </a:schemeClr>
+                  </a:outerShdw>
+                </a:effectLst>
+                <a:latin typeface="Agency FB" panose="020B0503020202020204" pitchFamily="34" charset="0"/>
+              </a:rPr>
+              <a:t>Teach</a:t>
+            </a:r>
+          </a:p>
+        </p:txBody>
+      </p:sp>
+      <p:sp>
+        <p:nvSpPr>
+          <p:cNvPr id="22" name="Rechteck 21"/>
+          <p:cNvSpPr/>
+          <p:nvPr/>
+        </p:nvSpPr>
+        <p:spPr>
+          <a:xfrm>
+            <a:off x="9719020" y="2144276"/>
+            <a:ext cx="1863379" cy="1061829"/>
+          </a:xfrm>
+          <a:prstGeom prst="rect">
+            <a:avLst/>
+          </a:prstGeom>
+          <a:noFill/>
+        </p:spPr>
+        <p:txBody>
+          <a:bodyPr wrap="square" lIns="91440" tIns="45720" rIns="91440" bIns="45720" anchor="ctr">
+            <a:spAutoFit/>
+          </a:bodyPr>
+          <a:lstStyle/>
+          <a:p>
+            <a:pPr algn="ctr"/>
+            <a:r>
+              <a:rPr lang="de-DE" sz="6300" dirty="0">
+                <a:ln w="0">
+                  <a:solidFill>
+                    <a:schemeClr val="tx1"/>
+                  </a:solidFill>
+                </a:ln>
+                <a:solidFill>
+                  <a:schemeClr val="accent2"/>
+                </a:solidFill>
+                <a:effectLst>
+                  <a:outerShdw blurRad="38100" dist="19050" dir="2700000" algn="tl" rotWithShape="0">
+                    <a:schemeClr val="dk1">
+                      <a:alpha val="40000"/>
+                    </a:schemeClr>
+                  </a:outerShdw>
+                </a:effectLst>
+                <a:latin typeface="Agency FB" panose="020B0503020202020204" pitchFamily="34" charset="0"/>
+              </a:rPr>
+              <a:t>Output</a:t>
+            </a:r>
+          </a:p>
+        </p:txBody>
+      </p:sp>
+      <p:sp>
+        <p:nvSpPr>
+          <p:cNvPr id="23" name="Rechteck 22"/>
+          <p:cNvSpPr/>
+          <p:nvPr/>
+        </p:nvSpPr>
+        <p:spPr>
+          <a:xfrm>
+            <a:off x="5191127" y="4962192"/>
+            <a:ext cx="1863379" cy="1077218"/>
+          </a:xfrm>
+          <a:prstGeom prst="rect">
+            <a:avLst/>
+          </a:prstGeom>
+          <a:noFill/>
+        </p:spPr>
+        <p:txBody>
+          <a:bodyPr wrap="square" lIns="91440" tIns="45720" rIns="91440" bIns="45720" anchor="ctr">
+            <a:spAutoFit/>
+          </a:bodyPr>
+          <a:lstStyle/>
+          <a:p>
+            <a:pPr algn="ctr"/>
+            <a:r>
+              <a:rPr lang="de-DE" sz="6300" dirty="0">
+                <a:ln w="0">
+                  <a:solidFill>
+                    <a:schemeClr val="tx1"/>
+                  </a:solidFill>
+                </a:ln>
+                <a:solidFill>
+                  <a:schemeClr val="accent2"/>
+                </a:solidFill>
+                <a:effectLst>
+                  <a:outerShdw blurRad="38100" dist="19050" dir="2700000" algn="tl" rotWithShape="0">
+                    <a:schemeClr val="dk1">
+                      <a:alpha val="40000"/>
+                    </a:schemeClr>
+                  </a:outerShdw>
+                </a:effectLst>
+                <a:latin typeface="Agency FB" panose="020B0503020202020204" pitchFamily="34" charset="0"/>
+              </a:rPr>
+              <a:t>Error</a:t>
+            </a:r>
+          </a:p>
+        </p:txBody>
+      </p:sp>
     </p:spTree>
     <p:extLst>
       <p:ext uri="{BB962C8B-B14F-4D97-AF65-F5344CB8AC3E}">
@@ -4550,6 +4753,156 @@
                                           </p:stCondLst>
                                         </p:cTn>
                                         <p:tgtEl>
+                                          <p:spTgt spid="15"/>
+                                        </p:tgtEl>
+                                        <p:attrNameLst>
+                                          <p:attrName>style.visibility</p:attrName>
+                                        </p:attrNameLst>
+                                      </p:cBhvr>
+                                      <p:to>
+                                        <p:strVal val="visible"/>
+                                      </p:to>
+                                    </p:set>
+                                    <p:animEffect transition="in" filter="fade">
+                                      <p:cBhvr>
+                                        <p:cTn id="15" dur="500"/>
+                                        <p:tgtEl>
+                                          <p:spTgt spid="15"/>
+                                        </p:tgtEl>
+                                      </p:cBhvr>
+                                    </p:animEffect>
+                                  </p:childTnLst>
+                                </p:cTn>
+                              </p:par>
+                              <p:par>
+                                <p:cTn id="16" presetID="10" presetClass="entr" presetSubtype="0" fill="hold" grpId="0" nodeType="withEffect">
+                                  <p:stCondLst>
+                                    <p:cond delay="0"/>
+                                  </p:stCondLst>
+                                  <p:childTnLst>
+                                    <p:set>
+                                      <p:cBhvr>
+                                        <p:cTn id="17" dur="1" fill="hold">
+                                          <p:stCondLst>
+                                            <p:cond delay="0"/>
+                                          </p:stCondLst>
+                                        </p:cTn>
+                                        <p:tgtEl>
+                                          <p:spTgt spid="20"/>
+                                        </p:tgtEl>
+                                        <p:attrNameLst>
+                                          <p:attrName>style.visibility</p:attrName>
+                                        </p:attrNameLst>
+                                      </p:cBhvr>
+                                      <p:to>
+                                        <p:strVal val="visible"/>
+                                      </p:to>
+                                    </p:set>
+                                    <p:animEffect transition="in" filter="fade">
+                                      <p:cBhvr>
+                                        <p:cTn id="18" dur="500"/>
+                                        <p:tgtEl>
+                                          <p:spTgt spid="20"/>
+                                        </p:tgtEl>
+                                      </p:cBhvr>
+                                    </p:animEffect>
+                                  </p:childTnLst>
+                                </p:cTn>
+                              </p:par>
+                              <p:par>
+                                <p:cTn id="19" presetID="9" presetClass="emph" presetSubtype="0" nodeType="withEffect">
+                                  <p:stCondLst>
+                                    <p:cond delay="0"/>
+                                  </p:stCondLst>
+                                  <p:childTnLst>
+                                    <p:set>
+                                      <p:cBhvr>
+                                        <p:cTn id="20" dur="indefinite"/>
+                                        <p:tgtEl>
+                                          <p:spTgt spid="4"/>
+                                        </p:tgtEl>
+                                        <p:attrNameLst>
+                                          <p:attrName>style.opacity</p:attrName>
+                                        </p:attrNameLst>
+                                      </p:cBhvr>
+                                      <p:to>
+                                        <p:strVal val="0.5"/>
+                                      </p:to>
+                                    </p:set>
+                                    <p:animEffect filter="image" prLst="opacity: 0.5">
+                                      <p:cBhvr rctx="IE">
+                                        <p:cTn id="21" dur="indefinite"/>
+                                        <p:tgtEl>
+                                          <p:spTgt spid="4"/>
+                                        </p:tgtEl>
+                                      </p:cBhvr>
+                                    </p:animEffect>
+                                  </p:childTnLst>
+                                </p:cTn>
+                              </p:par>
+                              <p:par>
+                                <p:cTn id="22" presetID="9" presetClass="emph" presetSubtype="0" nodeType="withEffect">
+                                  <p:stCondLst>
+                                    <p:cond delay="0"/>
+                                  </p:stCondLst>
+                                  <p:childTnLst>
+                                    <p:set>
+                                      <p:cBhvr>
+                                        <p:cTn id="23" dur="indefinite"/>
+                                        <p:tgtEl>
+                                          <p:spTgt spid="5"/>
+                                        </p:tgtEl>
+                                        <p:attrNameLst>
+                                          <p:attrName>style.opacity</p:attrName>
+                                        </p:attrNameLst>
+                                      </p:cBhvr>
+                                      <p:to>
+                                        <p:strVal val="0.5"/>
+                                      </p:to>
+                                    </p:set>
+                                    <p:animEffect filter="image" prLst="opacity: 0.5">
+                                      <p:cBhvr rctx="IE">
+                                        <p:cTn id="24" dur="indefinite"/>
+                                        <p:tgtEl>
+                                          <p:spTgt spid="5"/>
+                                        </p:tgtEl>
+                                      </p:cBhvr>
+                                    </p:animEffect>
+                                  </p:childTnLst>
+                                </p:cTn>
+                              </p:par>
+                            </p:childTnLst>
+                          </p:cTn>
+                        </p:par>
+                      </p:childTnLst>
+                    </p:cTn>
+                  </p:par>
+                  <p:par>
+                    <p:cTn id="25" fill="hold">
+                      <p:stCondLst>
+                        <p:cond delay="indefinite"/>
+                      </p:stCondLst>
+                      <p:childTnLst>
+                        <p:par>
+                          <p:cTn id="26" fill="hold">
+                            <p:stCondLst>
+                              <p:cond delay="0"/>
+                            </p:stCondLst>
+                            <p:childTnLst>
+                              <p:par>
+                                <p:cTn id="27" presetID="10" presetClass="entr" presetSubtype="0" fill="hold" grpId="0" nodeType="clickEffect">
+                                  <p:stCondLst>
+                                    <p:cond delay="0"/>
+                                  </p:stCondLst>
+                                  <p:childTnLst>
+                                    <p:set>
+                                      <p:cBhvr>
+                                        <p:cTn id="28" dur="1" fill="hold">
+                                          <p:stCondLst>
+                                            <p:cond delay="0"/>
+                                          </p:stCondLst>
+                                        </p:cTn>
+                                        <p:tgtEl>
                                           <p:spTgt spid="7"/>
                                         </p:tgtEl>
                                         <p:attrNameLst>
@@ -4562,7 +4915,7 @@
                                     </p:set>
                                     <p:animEffect transition="in" filter="fade">
                                       <p:cBhvr>
-                                        <p:cTn id="15" dur="500"/>
+                                        <p:cTn id="29" dur="500"/>
                                         <p:tgtEl>
                                           <p:spTgt spid="7"/>
                                         </p:tgtEl>
@@ -4578,26 +4931,26 @@
                     </p:cTn>
                   </p:par>
                   <p:par>
-                    <p:cTn id="16" fill="hold">
+                    <p:cTn id="30" fill="hold">
                       <p:stCondLst>
                         <p:cond delay="indefinite"/>
                       </p:stCondLst>
                       <p:childTnLst>
                         <p:par>
-                          <p:cTn id="17" fill="hold">
+                          <p:cTn id="31" fill="hold">
                             <p:stCondLst>
                               <p:cond delay="0"/>
                             </p:stCondLst>
                             <p:childTnLst>
                               <p:par>
-                                <p:cTn id="18" presetID="10" presetClass="entr" presetSubtype="0" fill="hold" grpId="0" nodeType="clickEffect">
+                                <p:cTn id="32" presetID="10" presetClass="entr" presetSubtype="0" fill="hold" grpId="0" nodeType="clickEffect">
                                   <p:stCondLst>
                                     <p:cond delay="0"/>
                                   </p:stCondLst>
                                   <p:childTnLst>
                                     <p:set>
                                       <p:cBhvr>
-                                        <p:cTn id="19" dur="1" fill="hold">
+                                        <p:cTn id="33" dur="1" fill="hold">
                                           <p:stCondLst>
                                             <p:cond delay="0"/>
                                           </p:stCondLst>
@@ -4615,7 +4968,7 @@
                                     </p:set>
                                     <p:animEffect transition="in" filter="fade">
                                       <p:cBhvr>
-                                        <p:cTn id="20" dur="500"/>
+                                        <p:cTn id="34" dur="500"/>
                                         <p:tgtEl>
                                           <p:spTgt spid="8"/>
                                         </p:tgtEl>
@@ -4631,26 +4984,26 @@
                     </p:cTn>
                   </p:par>
                   <p:par>
-                    <p:cTn id="21" fill="hold">
+                    <p:cTn id="35" fill="hold">
                       <p:stCondLst>
                         <p:cond delay="indefinite"/>
                       </p:stCondLst>
                       <p:childTnLst>
                         <p:par>
-                          <p:cTn id="22" fill="hold">
+                          <p:cTn id="36" fill="hold">
                             <p:stCondLst>
                               <p:cond delay="0"/>
                             </p:stCondLst>
                             <p:childTnLst>
                               <p:par>
-                                <p:cTn id="23" presetID="10" presetClass="entr" presetSubtype="0" fill="hold" grpId="0" nodeType="clickEffect">
+                                <p:cTn id="37" presetID="10" presetClass="entr" presetSubtype="0" fill="hold" grpId="0" nodeType="clickEffect">
                                   <p:stCondLst>
                                     <p:cond delay="0"/>
                                   </p:stCondLst>
                                   <p:childTnLst>
                                     <p:set>
                                       <p:cBhvr>
-                                        <p:cTn id="24" dur="1" fill="hold">
+                                        <p:cTn id="38" dur="1" fill="hold">
                                           <p:stCondLst>
                                             <p:cond delay="0"/>
                                           </p:stCondLst>
@@ -4668,7 +5021,7 @@
                                     </p:set>
                                     <p:animEffect transition="in" filter="fade">
                                       <p:cBhvr>
-                                        <p:cTn id="25" dur="500"/>
+                                        <p:cTn id="39" dur="500"/>
                                         <p:tgtEl>
                                           <p:spTgt spid="9"/>
                                         </p:tgtEl>
@@ -4678,14 +5031,14 @@
                                 </p:cTn>
                               </p:par>
                               <p:par>
-                                <p:cTn id="26" presetID="10" presetClass="entr" presetSubtype="0" fill="hold" nodeType="withEffect">
+                                <p:cTn id="40" presetID="10" presetClass="entr" presetSubtype="0" fill="hold" nodeType="withEffect">
                                   <p:stCondLst>
                                     <p:cond delay="0"/>
                                   </p:stCondLst>
                                   <p:childTnLst>
                                     <p:set>
                                       <p:cBhvr>
-                                        <p:cTn id="27" dur="1" fill="hold">
+                                        <p:cTn id="41" dur="1" fill="hold">
                                           <p:stCondLst>
                                             <p:cond delay="0"/>
                                           </p:stCondLst>
@@ -4703,7 +5056,7 @@
                                     </p:set>
                                     <p:animEffect transition="in" filter="fade">
                                       <p:cBhvr>
-                                        <p:cTn id="28" dur="500"/>
+                                        <p:cTn id="42" dur="500"/>
                                         <p:tgtEl>
                                           <p:spTgt spid="6"/>
                                         </p:tgtEl>
@@ -4719,26 +5072,110 @@
                     </p:cTn>
                   </p:par>
                   <p:par>
-                    <p:cTn id="29" fill="hold">
+                    <p:cTn id="43" fill="hold">
                       <p:stCondLst>
                         <p:cond delay="indefinite"/>
                       </p:stCondLst>
                       <p:childTnLst>
                         <p:par>
-                          <p:cTn id="30" fill="hold">
+                          <p:cTn id="44" fill="hold">
                             <p:stCondLst>
                               <p:cond delay="0"/>
                             </p:stCondLst>
                             <p:childTnLst>
                               <p:par>
-                                <p:cTn id="31" presetID="10" presetClass="entr" presetSubtype="0" fill="hold" nodeType="clickEffect">
+                                <p:cTn id="45" presetID="10" presetClass="entr" presetSubtype="0" fill="hold" grpId="0" nodeType="clickEffect">
                                   <p:stCondLst>
                                     <p:cond delay="0"/>
                                   </p:stCondLst>
                                   <p:childTnLst>
                                     <p:set>
                                       <p:cBhvr>
-                                        <p:cTn id="32" dur="1" fill="hold">
+                                        <p:cTn id="46" dur="1" fill="hold">
+                                          <p:stCondLst>
+                                            <p:cond delay="0"/>
+                                          </p:stCondLst>
+                                        </p:cTn>
+                                        <p:tgtEl>
+                                          <p:spTgt spid="22"/>
+                                        </p:tgtEl>
+                                        <p:attrNameLst>
+                                          <p:attrName>style.visibility</p:attrName>
+                                        </p:attrNameLst>
+                                      </p:cBhvr>
+                                      <p:to>
+                                        <p:strVal val="visible"/>
+                                      </p:to>
+                                    </p:set>
+                                    <p:animEffect transition="in" filter="fade">
+                                      <p:cBhvr>
+                                        <p:cTn id="47" dur="500"/>
+                                        <p:tgtEl>
+                                          <p:spTgt spid="22"/>
+                                        </p:tgtEl>
+                                      </p:cBhvr>
+                                    </p:animEffect>
+                                  </p:childTnLst>
+                                </p:cTn>
+                              </p:par>
+                              <p:par>
+                                <p:cTn id="48" presetID="9" presetClass="emph" presetSubtype="0" nodeType="withEffect">
+                                  <p:stCondLst>
+                                    <p:cond delay="0"/>
+                                  </p:stCondLst>
+                                  <p:childTnLst>
+                                    <p:set>
+                                      <p:cBhvr>
+                                        <p:cTn id="49" dur="indefinite"/>
+                                        <p:tgtEl>
+                                          <p:spTgt spid="6"/>
+                                        </p:tgtEl>
+                                        <p:attrNameLst>
+                                          <p:attrName>style.opacity</p:attrName>
+                                        </p:attrNameLst>
+                                      </p:cBhvr>
+                                      <p:to>
+                                        <p:strVal val="0.5"/>
+                                      </p:to>
+                                    </p:set>
+                                    <p:animEffect filter="image" prLst="opacity: 0.5">
+                                      <p:cBhvr rctx="IE">
+                                        <p:cTn id="50" dur="indefinite"/>
+                                        <p:tgtEl>
+                                          <p:spTgt spid="6"/>
+                                        </p:tgtEl>
+                                      </p:cBhvr>
+                                    </p:animEffect>
+                                  </p:childTnLst>
+                                </p:cTn>
+                              </p:par>
+                            </p:childTnLst>
+                          </p:cTn>
+                        </p:par>
+                      </p:childTnLst>
+                    </p:cTn>
+                  </p:par>
+                  <p:par>
+                    <p:cTn id="51" fill="hold">
+                      <p:stCondLst>
+                        <p:cond delay="indefinite"/>
+                      </p:stCondLst>
+                      <p:childTnLst>
+                        <p:par>
+                          <p:cTn id="52" fill="hold">
+                            <p:stCondLst>
+                              <p:cond delay="0"/>
+                            </p:stCondLst>
+                            <p:childTnLst>
+                              <p:par>
+                                <p:cTn id="53" presetID="10" presetClass="entr" presetSubtype="0" fill="hold" nodeType="clickEffect">
+                                  <p:stCondLst>
+                                    <p:cond delay="0"/>
+                                  </p:stCondLst>
+                                  <p:childTnLst>
+                                    <p:set>
+                                      <p:cBhvr>
+                                        <p:cTn id="54" dur="1" fill="hold">
                                           <p:stCondLst>
                                             <p:cond delay="0"/>
                                           </p:stCondLst>
@@ -4756,7 +5193,7 @@
                                     </p:set>
                                     <p:animEffect transition="in" filter="fade">
                                       <p:cBhvr>
-                                        <p:cTn id="33" dur="10"/>
+                                        <p:cTn id="55" dur="1000"/>
                                         <p:tgtEl>
                                           <p:spTgt spid="21"/>
                                         </p:tgtEl>
@@ -4765,24 +5202,15 @@
                                   </p:childTnLst>
                                 </p:cTn>
                               </p:par>
-                            </p:childTnLst>
-                          </p:cTn>
-                        </p:par>
-                        <p:par>
-                          <p:cTn id="34" fill="hold">
-                            <p:stCondLst>
-                              <p:cond delay="10"/>
-                            </p:stCondLst>
-                            <p:childTnLst>
                               <p:par>
-                                <p:cTn id="35" presetID="42" presetClass="path" presetSubtype="0" accel="50000" decel="50000" fill="hold" nodeType="afterEffect">
+                                <p:cTn id="56" presetID="42" presetClass="path" presetSubtype="0" accel="50000" decel="50000" fill="hold" nodeType="withEffect">
                                   <p:stCondLst>
                                     <p:cond delay="0"/>
                                   </p:stCondLst>
                                   <p:childTnLst>
                                     <p:animMotion origin="layout" path="M 2.29167E-6 3.7037E-6 L 2.29167E-6 0.41412 " pathEditMode="relative" rAng="0" ptsTypes="AA">
                                       <p:cBhvr>
-                                        <p:cTn id="36" dur="1000" fill="hold"/>
+                                        <p:cTn id="57" dur="1000" fill="hold"/>
                                         <p:tgtEl>
                                           <p:spTgt spid="21"/>
                                         </p:tgtEl>
@@ -4803,26 +5231,26 @@
                     </p:cTn>
                   </p:par>
                   <p:par>
-                    <p:cTn id="37" fill="hold">
+                    <p:cTn id="58" fill="hold">
                       <p:stCondLst>
                         <p:cond delay="indefinite"/>
                       </p:stCondLst>
                       <p:childTnLst>
                         <p:par>
-                          <p:cTn id="38" fill="hold">
+                          <p:cTn id="59" fill="hold">
                             <p:stCondLst>
                               <p:cond delay="0"/>
                             </p:stCondLst>
                             <p:childTnLst>
                               <p:par>
-                                <p:cTn id="39" presetID="10" presetClass="entr" presetSubtype="0" fill="hold" grpId="0" nodeType="clickEffect">
+                                <p:cTn id="60" presetID="10" presetClass="entr" presetSubtype="0" fill="hold" grpId="0" nodeType="clickEffect">
                                   <p:stCondLst>
                                     <p:cond delay="0"/>
                                   </p:stCondLst>
                                   <p:childTnLst>
                                     <p:set>
                                       <p:cBhvr>
-                                        <p:cTn id="40" dur="1" fill="hold">
+                                        <p:cTn id="61" dur="1" fill="hold">
                                           <p:stCondLst>
                                             <p:cond delay="0"/>
                                           </p:stCondLst>
@@ -4840,7 +5268,7 @@
                                     </p:set>
                                     <p:animEffect transition="in" filter="fade">
                                       <p:cBhvr>
-                                        <p:cTn id="41" dur="500"/>
+                                        <p:cTn id="62" dur="500"/>
                                         <p:tgtEl>
                                           <p:spTgt spid="18"/>
                                         </p:tgtEl>
@@ -4850,14 +5278,14 @@
                                 </p:cTn>
                               </p:par>
                               <p:par>
-                                <p:cTn id="42" presetID="10" presetClass="entr" presetSubtype="0" fill="hold" grpId="0" nodeType="withEffect">
+                                <p:cTn id="63" presetID="10" presetClass="entr" presetSubtype="0" fill="hold" grpId="0" nodeType="withEffect">
                                   <p:stCondLst>
                                     <p:cond delay="0"/>
                                   </p:stCondLst>
                                   <p:childTnLst>
                                     <p:set>
                                       <p:cBhvr>
-                                        <p:cTn id="43" dur="1" fill="hold">
+                                        <p:cTn id="64" dur="1" fill="hold">
                                           <p:stCondLst>
                                             <p:cond delay="0"/>
                                           </p:stCondLst>
@@ -4875,7 +5303,7 @@
                                     </p:set>
                                     <p:animEffect transition="in" filter="fade">
                                       <p:cBhvr>
-                                        <p:cTn id="44" dur="500"/>
+                                        <p:cTn id="65" dur="500"/>
                                         <p:tgtEl>
                                           <p:spTgt spid="17"/>
                                         </p:tgtEl>
@@ -4891,26 +5319,26 @@
                     </p:cTn>
                   </p:par>
                   <p:par>
-                    <p:cTn id="45" fill="hold">
+                    <p:cTn id="66" fill="hold">
                       <p:stCondLst>
                         <p:cond delay="indefinite"/>
                       </p:stCondLst>
                       <p:childTnLst>
                         <p:par>
-                          <p:cTn id="46" fill="hold">
+                          <p:cTn id="67" fill="hold">
                             <p:stCondLst>
                               <p:cond delay="0"/>
                             </p:stCondLst>
                             <p:childTnLst>
                               <p:par>
-                                <p:cTn id="47" presetID="10" presetClass="entr" presetSubtype="0" fill="hold" nodeType="clickEffect">
+                                <p:cTn id="68" presetID="10" presetClass="entr" presetSubtype="0" fill="hold" nodeType="clickEffect">
                                   <p:stCondLst>
                                     <p:cond delay="0"/>
                                   </p:stCondLst>
                                   <p:childTnLst>
                                     <p:set>
                                       <p:cBhvr>
-                                        <p:cTn id="48" dur="1" fill="hold">
+                                        <p:cTn id="69" dur="1" fill="hold">
                                           <p:stCondLst>
                                             <p:cond delay="0"/>
                                           </p:stCondLst>
@@ -4928,7 +5356,7 @@
                                     </p:set>
                                     <p:animEffect transition="in" filter="fade">
                                       <p:cBhvr>
-                                        <p:cTn id="49" dur="500"/>
+                                        <p:cTn id="70" dur="500"/>
                                         <p:tgtEl>
                                           <p:spTgt spid="16"/>
                                         </p:tgtEl>
@@ -4944,26 +5372,110 @@
                     </p:cTn>
                   </p:par>
                   <p:par>
-                    <p:cTn id="50" fill="hold">
+                    <p:cTn id="71" fill="hold">
                       <p:stCondLst>
                         <p:cond delay="indefinite"/>
                       </p:stCondLst>
                       <p:childTnLst>
                         <p:par>
-                          <p:cTn id="51" fill="hold">
+                          <p:cTn id="72" fill="hold">
                             <p:stCondLst>
                               <p:cond delay="0"/>
                             </p:stCondLst>
                             <p:childTnLst>
                               <p:par>
-                                <p:cTn id="52" presetID="10" presetClass="entr" presetSubtype="0" fill="hold" grpId="0" nodeType="clickEffect">
+                                <p:cTn id="73" presetID="10" presetClass="entr" presetSubtype="0" fill="hold" grpId="0" nodeType="clickEffect">
                                   <p:stCondLst>
                                     <p:cond delay="0"/>
                                   </p:stCondLst>
                                   <p:childTnLst>
                                     <p:set>
                                       <p:cBhvr>
-                                        <p:cTn id="53" dur="1" fill="hold">
+                                        <p:cTn id="74" dur="1" fill="hold">
+                                          <p:stCondLst>
+                                            <p:cond delay="0"/>
+                                          </p:stCondLst>
+                                        </p:cTn>
+                                        <p:tgtEl>
+                                          <p:spTgt spid="23"/>
+                                        </p:tgtEl>
+                                        <p:attrNameLst>
+                                          <p:attrName>style.visibility</p:attrName>
+                                        </p:attrNameLst>
+                                      </p:cBhvr>
+                                      <p:to>
+                                        <p:strVal val="visible"/>
+                                      </p:to>
+                                    </p:set>
+                                    <p:animEffect transition="in" filter="fade">
+                                      <p:cBhvr>
+                                        <p:cTn id="75" dur="500"/>
+                                        <p:tgtEl>
+                                          <p:spTgt spid="23"/>
+                                        </p:tgtEl>
+                                      </p:cBhvr>
+                                    </p:animEffect>
+                                  </p:childTnLst>
+                                </p:cTn>
+                              </p:par>
+                              <p:par>
+                                <p:cTn id="76" presetID="9" presetClass="emph" presetSubtype="0" nodeType="withEffect">
+                                  <p:stCondLst>
+                                    <p:cond delay="0"/>
+                                  </p:stCondLst>
+                                  <p:childTnLst>
+                                    <p:set>
+                                      <p:cBhvr>
+                                        <p:cTn id="77" dur="indefinite"/>
+                                        <p:tgtEl>
+                                          <p:spTgt spid="16"/>
+                                        </p:tgtEl>
+                                        <p:attrNameLst>
+                                          <p:attrName>style.opacity</p:attrName>
+                                        </p:attrNameLst>
+                                      </p:cBhvr>
+                                      <p:to>
+                                        <p:strVal val="0.5"/>
+                                      </p:to>
+                                    </p:set>
+                                    <p:animEffect filter="image" prLst="opacity: 0.5">
+                                      <p:cBhvr rctx="IE">
+                                        <p:cTn id="78" dur="indefinite"/>
+                                        <p:tgtEl>
+                                          <p:spTgt spid="16"/>
+                                        </p:tgtEl>
+                                      </p:cBhvr>
+                                    </p:animEffect>
+                                  </p:childTnLst>
+                                </p:cTn>
+                              </p:par>
+                            </p:childTnLst>
+                          </p:cTn>
+                        </p:par>
+                      </p:childTnLst>
+                    </p:cTn>
+                  </p:par>
+                  <p:par>
+                    <p:cTn id="79" fill="hold">
+                      <p:stCondLst>
+                        <p:cond delay="indefinite"/>
+                      </p:stCondLst>
+                      <p:childTnLst>
+                        <p:par>
+                          <p:cTn id="80" fill="hold">
+                            <p:stCondLst>
+                              <p:cond delay="0"/>
+                            </p:stCondLst>
+                            <p:childTnLst>
+                              <p:par>
+                                <p:cTn id="81" presetID="10" presetClass="entr" presetSubtype="0" fill="hold" grpId="0" nodeType="clickEffect">
+                                  <p:stCondLst>
+                                    <p:cond delay="0"/>
+                                  </p:stCondLst>
+                                  <p:childTnLst>
+                                    <p:set>
+                                      <p:cBhvr>
+                                        <p:cTn id="82" dur="1" fill="hold">
                                           <p:stCondLst>
                                             <p:cond delay="0"/>
                                           </p:stCondLst>
@@ -4981,7 +5493,7 @@
                                     </p:set>
                                     <p:animEffect transition="in" filter="fade">
                                       <p:cBhvr>
-                                        <p:cTn id="54" dur="500"/>
+                                        <p:cTn id="83" dur="500"/>
                                         <p:tgtEl>
                                           <p:spTgt spid="19"/>
                                         </p:tgtEl>
@@ -5024,6 +5536,10 @@
       <p:bldP spid="17" grpId="0" animBg="1"/>
       <p:bldP spid="18" grpId="0" animBg="1"/>
       <p:bldP spid="19" grpId="0" animBg="1"/>
+      <p:bldP spid="15" grpId="0"/>
+      <p:bldP spid="20" grpId="0"/>
+      <p:bldP spid="22" grpId="0"/>
+      <p:bldP spid="23" grpId="0"/>
     </p:bldLst>
   </p:timing>
 </p:sld>
@@ -5130,18 +5646,20 @@
           <a:p>
             <a:pPr algn="ctr"/>
             <a:r>
-              <a:rPr lang="de-DE" dirty="0" err="1"/>
+              <a:rPr lang="de-DE" sz="4900" dirty="0">
+                <a:latin typeface="Agency FB" panose="020B0503020202020204" pitchFamily="34" charset="0"/>
+              </a:rPr>
               <a:t>Neural</a:t>
             </a:r>
-            <a:endParaRPr lang="de-DE" dirty="0"/>
           </a:p>
           <a:p>
             <a:pPr algn="ctr"/>
             <a:r>
-              <a:rPr lang="de-DE" dirty="0" err="1"/>
+              <a:rPr lang="de-DE" sz="4900" dirty="0">
+                <a:latin typeface="Agency FB" panose="020B0503020202020204" pitchFamily="34" charset="0"/>
+              </a:rPr>
               <a:t>network</a:t>
             </a:r>
-            <a:endParaRPr lang="de-DE" dirty="0"/>
           </a:p>
         </p:txBody>
       </p:sp>
@@ -6138,6 +6656,559 @@
 </p:sld>
 </file>
 
+<file path=ppt/slides/slide5.xml><?xml version="1.0" encoding="utf-8"?>
+<p:sld xmlns:a="http://schemas.openxmlformats.org/drawingml/2006/main" xmlns:r="http://schemas.openxmlformats.org/officeDocument/2006/relationships" xmlns:p="http://schemas.openxmlformats.org/presentationml/2006/main">
+  <p:cSld>
+    <p:spTree>
+      <p:nvGrpSpPr>
+        <p:cNvPr id="1" name=""/>
+        <p:cNvGrpSpPr/>
+        <p:nvPr/>
+      </p:nvGrpSpPr>
+      <p:grpSpPr>
+        <a:xfrm>
+          <a:off x="0" y="0"/>
+          <a:ext cx="0" cy="0"/>
+          <a:chOff x="0" y="0"/>
+          <a:chExt cx="0" cy="0"/>
+        </a:xfrm>
+      </p:grpSpPr>
+      <p:sp>
+        <p:nvSpPr>
+          <p:cNvPr id="2" name="Titel 1"/>
+          <p:cNvSpPr>
+            <a:spLocks noGrp="1"/>
+          </p:cNvSpPr>
+          <p:nvPr>
+            <p:ph type="title"/>
+          </p:nvPr>
+        </p:nvSpPr>
+        <p:spPr/>
+        <p:txBody>
+          <a:bodyPr/>
+          <a:lstStyle/>
+          <a:p>
+            <a:r>
+              <a:rPr lang="de-DE" dirty="0"/>
+              <a:t>Test</a:t>
+            </a:r>
+          </a:p>
+        </p:txBody>
+      </p:sp>
+      <p:sp>
+        <p:nvSpPr>
+          <p:cNvPr id="3" name="Inhaltsplatzhalter 2"/>
+          <p:cNvSpPr>
+            <a:spLocks noGrp="1"/>
+          </p:cNvSpPr>
+          <p:nvPr>
+            <p:ph idx="1"/>
+          </p:nvPr>
+        </p:nvSpPr>
+        <p:spPr/>
+        <p:txBody>
+          <a:bodyPr/>
+          <a:lstStyle/>
+          <a:p>
+            <a:pPr marL="118872" indent="0">
+              <a:buNone/>
+            </a:pPr>
+            <a:r>
+              <a:rPr lang="de-DE" dirty="0"/>
+              <a:t> </a:t>
+            </a:r>
+          </a:p>
+        </p:txBody>
+      </p:sp>
+      <p:sp>
+        <p:nvSpPr>
+          <p:cNvPr id="7" name="Rechteck 6"/>
+          <p:cNvSpPr/>
+          <p:nvPr/>
+        </p:nvSpPr>
+        <p:spPr>
+          <a:xfrm>
+            <a:off x="5196000" y="3187996"/>
+            <a:ext cx="1800000" cy="1800000"/>
+          </a:xfrm>
+          <a:prstGeom prst="rect">
+            <a:avLst/>
+          </a:prstGeom>
+        </p:spPr>
+        <p:style>
+          <a:lnRef idx="2">
+            <a:schemeClr val="accent2">
+              <a:shade val="50000"/>
+            </a:schemeClr>
+          </a:lnRef>
+          <a:fillRef idx="1">
+            <a:schemeClr val="accent2"/>
+          </a:fillRef>
+          <a:effectRef idx="0">
+            <a:schemeClr val="accent2"/>
+          </a:effectRef>
+          <a:fontRef idx="minor">
+            <a:schemeClr val="lt1"/>
+          </a:fontRef>
+        </p:style>
+        <p:txBody>
+          <a:bodyPr rtlCol="0" anchor="ctr"/>
+          <a:lstStyle/>
+          <a:p>
+            <a:pPr algn="ctr"/>
+            <a:r>
+              <a:rPr lang="de-DE" sz="4900" dirty="0">
+                <a:latin typeface="Agency FB" panose="020B0503020202020204" pitchFamily="34" charset="0"/>
+              </a:rPr>
+              <a:t>Neural</a:t>
+            </a:r>
+          </a:p>
+          <a:p>
+            <a:pPr algn="ctr"/>
+            <a:r>
+              <a:rPr lang="de-DE" sz="4900" dirty="0">
+                <a:latin typeface="Agency FB" panose="020B0503020202020204" pitchFamily="34" charset="0"/>
+              </a:rPr>
+              <a:t>network</a:t>
+            </a:r>
+          </a:p>
+        </p:txBody>
+      </p:sp>
+      <p:sp>
+        <p:nvSpPr>
+          <p:cNvPr id="8" name="Pfeil: nach rechts 7"/>
+          <p:cNvSpPr/>
+          <p:nvPr/>
+        </p:nvSpPr>
+        <p:spPr>
+          <a:xfrm>
+            <a:off x="2646796" y="3914311"/>
+            <a:ext cx="2365200" cy="360000"/>
+          </a:xfrm>
+          <a:prstGeom prst="rightArrow">
+            <a:avLst/>
+          </a:prstGeom>
+        </p:spPr>
+        <p:style>
+          <a:lnRef idx="2">
+            <a:schemeClr val="accent1">
+              <a:shade val="50000"/>
+            </a:schemeClr>
+          </a:lnRef>
+          <a:fillRef idx="1">
+            <a:schemeClr val="accent1"/>
+          </a:fillRef>
+          <a:effectRef idx="0">
+            <a:schemeClr val="accent1"/>
+          </a:effectRef>
+          <a:fontRef idx="minor">
+            <a:schemeClr val="lt1"/>
+          </a:fontRef>
+        </p:style>
+        <p:txBody>
+          <a:bodyPr rtlCol="0" anchor="ctr"/>
+          <a:lstStyle/>
+          <a:p>
+            <a:pPr algn="ctr"/>
+            <a:endParaRPr lang="de-DE"/>
+          </a:p>
+        </p:txBody>
+      </p:sp>
+      <p:sp>
+        <p:nvSpPr>
+          <p:cNvPr id="9" name="Pfeil: nach rechts 8"/>
+          <p:cNvSpPr/>
+          <p:nvPr/>
+        </p:nvSpPr>
+        <p:spPr>
+          <a:xfrm>
+            <a:off x="7175131" y="3914311"/>
+            <a:ext cx="2365200" cy="360000"/>
+          </a:xfrm>
+          <a:prstGeom prst="rightArrow">
+            <a:avLst/>
+          </a:prstGeom>
+        </p:spPr>
+        <p:style>
+          <a:lnRef idx="2">
+            <a:schemeClr val="accent1">
+              <a:shade val="50000"/>
+            </a:schemeClr>
+          </a:lnRef>
+          <a:fillRef idx="1">
+            <a:schemeClr val="accent1"/>
+          </a:fillRef>
+          <a:effectRef idx="0">
+            <a:schemeClr val="accent1"/>
+          </a:effectRef>
+          <a:fontRef idx="minor">
+            <a:schemeClr val="lt1"/>
+          </a:fontRef>
+        </p:style>
+        <p:txBody>
+          <a:bodyPr rtlCol="0" anchor="ctr"/>
+          <a:lstStyle/>
+          <a:p>
+            <a:pPr algn="ctr"/>
+            <a:endParaRPr lang="de-DE"/>
+          </a:p>
+        </p:txBody>
+      </p:sp>
+      <p:pic>
+        <p:nvPicPr>
+          <p:cNvPr id="20" name="Grafik 19"/>
+          <p:cNvPicPr>
+            <a:picLocks noChangeAspect="1"/>
+          </p:cNvPicPr>
+          <p:nvPr/>
+        </p:nvPicPr>
+        <p:blipFill>
+          <a:blip r:embed="rId2">
+            <a:extLst>
+              <a:ext uri="{28A0092B-C50C-407E-A947-70E740481C1C}">
+                <a14:useLocalDpi xmlns:a14="http://schemas.microsoft.com/office/drawing/2010/main" val="0"/>
+              </a:ext>
+            </a:extLst>
+          </a:blip>
+          <a:stretch>
+            <a:fillRect/>
+          </a:stretch>
+        </p:blipFill>
+        <p:spPr>
+          <a:xfrm>
+            <a:off x="614473" y="3187996"/>
+            <a:ext cx="1858065" cy="1800000"/>
+          </a:xfrm>
+          <a:prstGeom prst="rect">
+            <a:avLst/>
+          </a:prstGeom>
+        </p:spPr>
+      </p:pic>
+      <p:pic>
+        <p:nvPicPr>
+          <p:cNvPr id="24" name="Grafik 23"/>
+          <p:cNvPicPr>
+            <a:picLocks noChangeAspect="1"/>
+          </p:cNvPicPr>
+          <p:nvPr/>
+        </p:nvPicPr>
+        <p:blipFill>
+          <a:blip r:embed="rId3">
+            <a:extLst>
+              <a:ext uri="{28A0092B-C50C-407E-A947-70E740481C1C}">
+                <a14:useLocalDpi xmlns:a14="http://schemas.microsoft.com/office/drawing/2010/main" val="0"/>
+              </a:ext>
+            </a:extLst>
+          </a:blip>
+          <a:stretch>
+            <a:fillRect/>
+          </a:stretch>
+        </p:blipFill>
+        <p:spPr>
+          <a:xfrm>
+            <a:off x="9719462" y="3187996"/>
+            <a:ext cx="1862937" cy="1800000"/>
+          </a:xfrm>
+          <a:prstGeom prst="rect">
+            <a:avLst/>
+          </a:prstGeom>
+        </p:spPr>
+      </p:pic>
+    </p:spTree>
+    <p:extLst>
+      <p:ext uri="{BB962C8B-B14F-4D97-AF65-F5344CB8AC3E}">
+        <p14:creationId xmlns:p14="http://schemas.microsoft.com/office/powerpoint/2010/main" val="2167052949"/>
+      </p:ext>
+    </p:extLst>
+  </p:cSld>
+  <p:clrMapOvr>
+    <a:masterClrMapping/>
+  </p:clrMapOvr>
+  <p:timing>
+    <p:tnLst>
+      <p:par>
+        <p:cTn id="1" dur="indefinite" restart="never" nodeType="tmRoot">
+          <p:childTnLst>
+            <p:seq concurrent="1" nextAc="seek">
+              <p:cTn id="2" dur="indefinite" nodeType="mainSeq">
+                <p:childTnLst>
+                  <p:par>
+                    <p:cTn id="3" fill="hold">
+                      <p:stCondLst>
+                        <p:cond delay="indefinite"/>
+                      </p:stCondLst>
+                      <p:childTnLst>
+                        <p:par>
+                          <p:cTn id="4" fill="hold">
+                            <p:stCondLst>
+                              <p:cond delay="0"/>
+                            </p:stCondLst>
+                            <p:childTnLst>
+                              <p:par>
+                                <p:cTn id="5" presetID="10" presetClass="entr" presetSubtype="0" fill="hold" nodeType="clickEffect">
+                                  <p:stCondLst>
+                                    <p:cond delay="0"/>
+                                  </p:stCondLst>
+                                  <p:childTnLst>
+                                    <p:set>
+                                      <p:cBhvr>
+                                        <p:cTn id="6" dur="1" fill="hold">
+                                          <p:stCondLst>
+                                            <p:cond delay="0"/>
+                                          </p:stCondLst>
+                                        </p:cTn>
+                                        <p:tgtEl>
+                                          <p:spTgt spid="20"/>
+                                        </p:tgtEl>
+                                        <p:attrNameLst>
+                                          <p:attrName>style.visibility</p:attrName>
+                                        </p:attrNameLst>
+                                      </p:cBhvr>
+                                      <p:to>
+                                        <p:strVal val="visible"/>
+                                      </p:to>
+                                    </p:set>
+                                    <p:animEffect transition="in" filter="fade">
+                                      <p:cBhvr>
+                                        <p:cTn id="7" dur="500"/>
+                                        <p:tgtEl>
+                                          <p:spTgt spid="20"/>
+                                        </p:tgtEl>
+                                      </p:cBhvr>
+                                    </p:animEffect>
+                                  </p:childTnLst>
+                                </p:cTn>
+                              </p:par>
+                            </p:childTnLst>
+                          </p:cTn>
+                        </p:par>
+                      </p:childTnLst>
+                    </p:cTn>
+                  </p:par>
+                  <p:par>
+                    <p:cTn id="8" fill="hold">
+                      <p:stCondLst>
+                        <p:cond delay="indefinite"/>
+                      </p:stCondLst>
+                      <p:childTnLst>
+                        <p:par>
+                          <p:cTn id="9" fill="hold">
+                            <p:stCondLst>
+                              <p:cond delay="0"/>
+                            </p:stCondLst>
+                            <p:childTnLst>
+                              <p:par>
+                                <p:cTn id="10" presetID="10" presetClass="entr" presetSubtype="0" fill="hold" grpId="0" nodeType="clickEffect">
+                                  <p:stCondLst>
+                                    <p:cond delay="0"/>
+                                  </p:stCondLst>
+                                  <p:childTnLst>
+                                    <p:set>
+                                      <p:cBhvr>
+                                        <p:cTn id="11" dur="1" fill="hold">
+                                          <p:stCondLst>
+                                            <p:cond delay="0"/>
+                                          </p:stCondLst>
+                                        </p:cTn>
+                                        <p:tgtEl>
+                                          <p:spTgt spid="7"/>
+                                        </p:tgtEl>
+                                        <p:attrNameLst>
+                                          <p:attrName>style.visibility</p:attrName>
+                                        </p:attrNameLst>
+                                      </p:cBhvr>
+                                      <p:to>
+                                        <p:strVal val="visible"/>
+                                      </p:to>
+                                    </p:set>
+                                    <p:animEffect transition="in" filter="fade">
+                                      <p:cBhvr>
+                                        <p:cTn id="12" dur="500"/>
+                                        <p:tgtEl>
+                                          <p:spTgt spid="7"/>
+                                        </p:tgtEl>
+                                      </p:cBhvr>
+                                    </p:animEffect>
+                                  </p:childTnLst>
+                                </p:cTn>
+                              </p:par>
+                            </p:childTnLst>
+                          </p:cTn>
+                        </p:par>
+                      </p:childTnLst>
+                    </p:cTn>
+                  </p:par>
+                  <p:par>
+                    <p:cTn id="13" fill="hold">
+                      <p:stCondLst>
+                        <p:cond delay="indefinite"/>
+                      </p:stCondLst>
+                      <p:childTnLst>
+                        <p:par>
+                          <p:cTn id="14" fill="hold">
+                            <p:stCondLst>
+                              <p:cond delay="0"/>
+                            </p:stCondLst>
+                            <p:childTnLst>
+                              <p:par>
+                                <p:cTn id="15" presetID="10" presetClass="entr" presetSubtype="0" fill="hold" grpId="0" nodeType="clickEffect">
+                                  <p:stCondLst>
+                                    <p:cond delay="0"/>
+                                  </p:stCondLst>
+                                  <p:childTnLst>
+                                    <p:set>
+                                      <p:cBhvr>
+                                        <p:cTn id="16" dur="1" fill="hold">
+                                          <p:stCondLst>
+                                            <p:cond delay="0"/>
+                                          </p:stCondLst>
+                                        </p:cTn>
+                                        <p:tgtEl>
+                                          <p:spTgt spid="8"/>
+                                        </p:tgtEl>
+                                        <p:attrNameLst>
+                                          <p:attrName>style.visibility</p:attrName>
+                                        </p:attrNameLst>
+                                      </p:cBhvr>
+                                      <p:to>
+                                        <p:strVal val="visible"/>
+                                      </p:to>
+                                    </p:set>
+                                    <p:animEffect transition="in" filter="fade">
+                                      <p:cBhvr>
+                                        <p:cTn id="17" dur="500"/>
+                                        <p:tgtEl>
+                                          <p:spTgt spid="8"/>
+                                        </p:tgtEl>
+                                      </p:cBhvr>
+                                    </p:animEffect>
+                                  </p:childTnLst>
+                                </p:cTn>
+                              </p:par>
+                            </p:childTnLst>
+                          </p:cTn>
+                        </p:par>
+                      </p:childTnLst>
+                    </p:cTn>
+                  </p:par>
+                  <p:par>
+                    <p:cTn id="18" fill="hold">
+                      <p:stCondLst>
+                        <p:cond delay="indefinite"/>
+                      </p:stCondLst>
+                      <p:childTnLst>
+                        <p:par>
+                          <p:cTn id="19" fill="hold">
+                            <p:stCondLst>
+                              <p:cond delay="0"/>
+                            </p:stCondLst>
+                            <p:childTnLst>
+                              <p:par>
+                                <p:cTn id="20" presetID="10" presetClass="entr" presetSubtype="0" fill="hold" grpId="0" nodeType="clickEffect">
+                                  <p:stCondLst>
+                                    <p:cond delay="0"/>
+                                  </p:stCondLst>
+                                  <p:childTnLst>
+                                    <p:set>
+                                      <p:cBhvr>
+                                        <p:cTn id="21" dur="1" fill="hold">
+                                          <p:stCondLst>
+                                            <p:cond delay="0"/>
+                                          </p:stCondLst>
+                                        </p:cTn>
+                                        <p:tgtEl>
+                                          <p:spTgt spid="9"/>
+                                        </p:tgtEl>
+                                        <p:attrNameLst>
+                                          <p:attrName>style.visibility</p:attrName>
+                                        </p:attrNameLst>
+                                      </p:cBhvr>
+                                      <p:to>
+                                        <p:strVal val="visible"/>
+                                      </p:to>
+                                    </p:set>
+                                    <p:animEffect transition="in" filter="fade">
+                                      <p:cBhvr>
+                                        <p:cTn id="22" dur="500"/>
+                                        <p:tgtEl>
+                                          <p:spTgt spid="9"/>
+                                        </p:tgtEl>
+                                      </p:cBhvr>
+                                    </p:animEffect>
+                                  </p:childTnLst>
+                                </p:cTn>
+                              </p:par>
+                              <p:par>
+                                <p:cTn id="23" presetID="10" presetClass="entr" presetSubtype="0" fill="hold" nodeType="withEffect">
+                                  <p:stCondLst>
+                                    <p:cond delay="0"/>
+                                  </p:stCondLst>
+                                  <p:childTnLst>
+                                    <p:set>
+                                      <p:cBhvr>
+                                        <p:cTn id="24" dur="1" fill="hold">
+                                          <p:stCondLst>
+                                            <p:cond delay="0"/>
+                                          </p:stCondLst>
+                                        </p:cTn>
+                                        <p:tgtEl>
+                                          <p:spTgt spid="24"/>
+                                        </p:tgtEl>
+                                        <p:attrNameLst>
+                                          <p:attrName>style.visibility</p:attrName>
+                                        </p:attrNameLst>
+                                      </p:cBhvr>
+                                      <p:to>
+                                        <p:strVal val="visible"/>
+                                      </p:to>
+                                    </p:set>
+                                    <p:animEffect transition="in" filter="fade">
+                                      <p:cBhvr>
+                                        <p:cTn id="25" dur="500"/>
+                                        <p:tgtEl>
+                                          <p:spTgt spid="24"/>
+                                        </p:tgtEl>
+                                      </p:cBhvr>
+                                    </p:animEffect>
+                                  </p:childTnLst>
+                                </p:cTn>
+                              </p:par>
+                            </p:childTnLst>
+                          </p:cTn>
+                        </p:par>
+                      </p:childTnLst>
+                    </p:cTn>
+                  </p:par>
+                </p:childTnLst>
+              </p:cTn>
+              <p:prevCondLst>
+                <p:cond evt="onPrev" delay="0">
+                  <p:tgtEl>
+                    <p:sldTgt/>
+                  </p:tgtEl>
+                </p:cond>
+              </p:prevCondLst>
+              <p:nextCondLst>
+                <p:cond evt="onNext" delay="0">
+                  <p:tgtEl>
+                    <p:sldTgt/>
+                  </p:tgtEl>
+                </p:cond>
+              </p:nextCondLst>
+            </p:seq>
+          </p:childTnLst>
+        </p:cTn>
+      </p:par>
+    </p:tnLst>
+    <p:bldLst>
+      <p:bldP spid="7" grpId="0" animBg="1"/>
+      <p:bldP spid="8" grpId="0" animBg="1"/>
+      <p:bldP spid="9" grpId="0" animBg="1"/>
+    </p:bldLst>
+  </p:timing>
+</p:sld>
+</file>
+
 <file path=ppt/theme/theme1.xml><?xml version="1.0" encoding="utf-8"?>
 <a:theme xmlns:a="http://schemas.openxmlformats.org/drawingml/2006/main" name="Design1">
   <a:themeElements>

</xml_diff>

<commit_message>
Add first try for subsampling
</commit_message>
<xml_diff>
--- a/docs/Anfangspräsentation.pptx
+++ b/docs/Anfangspräsentation.pptx
@@ -10,6 +10,8 @@
     <p:sldId id="259" r:id="rId4"/>
     <p:sldId id="260" r:id="rId5"/>
     <p:sldId id="261" r:id="rId6"/>
+    <p:sldId id="262" r:id="rId7"/>
+    <p:sldId id="263" r:id="rId8"/>
   </p:sldIdLst>
   <p:sldSz cx="12192000" cy="6858000"/>
   <p:notesSz cx="6858000" cy="9144000"/>
@@ -362,7 +364,7 @@
           <a:p>
             <a:fld id="{EC7931AB-0497-43F1-8402-A51CA806FA3D}" type="datetimeFigureOut">
               <a:rPr lang="de-DE" smtClean="0"/>
-              <a:t>25.02.2017</a:t>
+              <a:t>28.02.2017</a:t>
             </a:fld>
             <a:endParaRPr lang="de-DE"/>
           </a:p>
@@ -584,7 +586,7 @@
           <a:p>
             <a:fld id="{EC7931AB-0497-43F1-8402-A51CA806FA3D}" type="datetimeFigureOut">
               <a:rPr lang="de-DE" smtClean="0"/>
-              <a:t>25.02.2017</a:t>
+              <a:t>28.02.2017</a:t>
             </a:fld>
             <a:endParaRPr lang="de-DE"/>
           </a:p>
@@ -861,7 +863,7 @@
           <a:p>
             <a:fld id="{EC7931AB-0497-43F1-8402-A51CA806FA3D}" type="datetimeFigureOut">
               <a:rPr lang="de-DE" smtClean="0"/>
-              <a:t>25.02.2017</a:t>
+              <a:t>28.02.2017</a:t>
             </a:fld>
             <a:endParaRPr lang="de-DE"/>
           </a:p>
@@ -1041,7 +1043,7 @@
           <a:p>
             <a:fld id="{EC7931AB-0497-43F1-8402-A51CA806FA3D}" type="datetimeFigureOut">
               <a:rPr lang="de-DE" smtClean="0"/>
-              <a:t>25.02.2017</a:t>
+              <a:t>28.02.2017</a:t>
             </a:fld>
             <a:endParaRPr lang="de-DE"/>
           </a:p>
@@ -1400,7 +1402,7 @@
           <a:p>
             <a:fld id="{EC7931AB-0497-43F1-8402-A51CA806FA3D}" type="datetimeFigureOut">
               <a:rPr lang="de-DE" smtClean="0"/>
-              <a:t>25.02.2017</a:t>
+              <a:t>28.02.2017</a:t>
             </a:fld>
             <a:endParaRPr lang="de-DE"/>
           </a:p>
@@ -1690,7 +1692,7 @@
           <a:p>
             <a:fld id="{EC7931AB-0497-43F1-8402-A51CA806FA3D}" type="datetimeFigureOut">
               <a:rPr lang="de-DE" smtClean="0"/>
-              <a:t>25.02.2017</a:t>
+              <a:t>28.02.2017</a:t>
             </a:fld>
             <a:endParaRPr lang="de-DE"/>
           </a:p>
@@ -2117,7 +2119,7 @@
           <a:p>
             <a:fld id="{EC7931AB-0497-43F1-8402-A51CA806FA3D}" type="datetimeFigureOut">
               <a:rPr lang="de-DE" smtClean="0"/>
-              <a:t>25.02.2017</a:t>
+              <a:t>28.02.2017</a:t>
             </a:fld>
             <a:endParaRPr lang="de-DE"/>
           </a:p>
@@ -2235,7 +2237,7 @@
           <a:p>
             <a:fld id="{EC7931AB-0497-43F1-8402-A51CA806FA3D}" type="datetimeFigureOut">
               <a:rPr lang="de-DE" smtClean="0"/>
-              <a:t>25.02.2017</a:t>
+              <a:t>28.02.2017</a:t>
             </a:fld>
             <a:endParaRPr lang="de-DE"/>
           </a:p>
@@ -2330,7 +2332,7 @@
           <a:p>
             <a:fld id="{EC7931AB-0497-43F1-8402-A51CA806FA3D}" type="datetimeFigureOut">
               <a:rPr lang="de-DE" smtClean="0"/>
-              <a:t>25.02.2017</a:t>
+              <a:t>28.02.2017</a:t>
             </a:fld>
             <a:endParaRPr lang="de-DE"/>
           </a:p>
@@ -2613,7 +2615,7 @@
           <a:p>
             <a:fld id="{EC7931AB-0497-43F1-8402-A51CA806FA3D}" type="datetimeFigureOut">
               <a:rPr lang="de-DE" smtClean="0"/>
-              <a:t>25.02.2017</a:t>
+              <a:t>28.02.2017</a:t>
             </a:fld>
             <a:endParaRPr lang="de-DE"/>
           </a:p>
@@ -2980,7 +2982,7 @@
           <a:p>
             <a:fld id="{EC7931AB-0497-43F1-8402-A51CA806FA3D}" type="datetimeFigureOut">
               <a:rPr lang="de-DE" smtClean="0"/>
-              <a:t>25.02.2017</a:t>
+              <a:t>28.02.2017</a:t>
             </a:fld>
             <a:endParaRPr lang="de-DE"/>
           </a:p>
@@ -3410,7 +3412,7 @@
           <a:p>
             <a:fld id="{EC7931AB-0497-43F1-8402-A51CA806FA3D}" type="datetimeFigureOut">
               <a:rPr lang="de-DE" smtClean="0"/>
-              <a:t>25.02.2017</a:t>
+              <a:t>28.02.2017</a:t>
             </a:fld>
             <a:endParaRPr lang="de-DE"/>
           </a:p>
@@ -7172,6 +7174,296 @@
 </p:sld>
 </file>
 
+<file path=ppt/slides/slide6.xml><?xml version="1.0" encoding="utf-8"?>
+<p:sld xmlns:a="http://schemas.openxmlformats.org/drawingml/2006/main" xmlns:r="http://schemas.openxmlformats.org/officeDocument/2006/relationships" xmlns:p="http://schemas.openxmlformats.org/presentationml/2006/main">
+  <p:cSld>
+    <p:spTree>
+      <p:nvGrpSpPr>
+        <p:cNvPr id="1" name=""/>
+        <p:cNvGrpSpPr/>
+        <p:nvPr/>
+      </p:nvGrpSpPr>
+      <p:grpSpPr>
+        <a:xfrm>
+          <a:off x="0" y="0"/>
+          <a:ext cx="0" cy="0"/>
+          <a:chOff x="0" y="0"/>
+          <a:chExt cx="0" cy="0"/>
+        </a:xfrm>
+      </p:grpSpPr>
+      <p:sp>
+        <p:nvSpPr>
+          <p:cNvPr id="2" name="Titel 1"/>
+          <p:cNvSpPr>
+            <a:spLocks noGrp="1"/>
+          </p:cNvSpPr>
+          <p:nvPr>
+            <p:ph type="title"/>
+          </p:nvPr>
+        </p:nvSpPr>
+        <p:spPr/>
+        <p:txBody>
+          <a:bodyPr/>
+          <a:lstStyle/>
+          <a:p>
+            <a:r>
+              <a:rPr lang="de-DE" dirty="0"/>
+              <a:t>Subsampling</a:t>
+            </a:r>
+          </a:p>
+        </p:txBody>
+      </p:sp>
+      <p:sp>
+        <p:nvSpPr>
+          <p:cNvPr id="3" name="Inhaltsplatzhalter 2"/>
+          <p:cNvSpPr>
+            <a:spLocks noGrp="1"/>
+          </p:cNvSpPr>
+          <p:nvPr>
+            <p:ph idx="1"/>
+          </p:nvPr>
+        </p:nvSpPr>
+        <p:spPr/>
+        <p:txBody>
+          <a:bodyPr/>
+          <a:lstStyle/>
+          <a:p>
+            <a:pPr marL="118872" indent="0">
+              <a:buNone/>
+            </a:pPr>
+            <a:r>
+              <a:rPr lang="de-DE" dirty="0"/>
+              <a:t> </a:t>
+            </a:r>
+          </a:p>
+        </p:txBody>
+      </p:sp>
+      <p:sp>
+        <p:nvSpPr>
+          <p:cNvPr id="9" name="Pfeil: nach rechts 8"/>
+          <p:cNvSpPr/>
+          <p:nvPr/>
+        </p:nvSpPr>
+        <p:spPr>
+          <a:xfrm>
+            <a:off x="3199277" y="2675192"/>
+            <a:ext cx="1440000" cy="360000"/>
+          </a:xfrm>
+          <a:prstGeom prst="rightArrow">
+            <a:avLst/>
+          </a:prstGeom>
+        </p:spPr>
+        <p:style>
+          <a:lnRef idx="2">
+            <a:schemeClr val="accent1">
+              <a:shade val="50000"/>
+            </a:schemeClr>
+          </a:lnRef>
+          <a:fillRef idx="1">
+            <a:schemeClr val="accent1"/>
+          </a:fillRef>
+          <a:effectRef idx="0">
+            <a:schemeClr val="accent1"/>
+          </a:effectRef>
+          <a:fontRef idx="minor">
+            <a:schemeClr val="lt1"/>
+          </a:fontRef>
+        </p:style>
+        <p:txBody>
+          <a:bodyPr rtlCol="0" anchor="ctr"/>
+          <a:lstStyle/>
+          <a:p>
+            <a:pPr algn="ctr"/>
+            <a:endParaRPr lang="de-DE"/>
+          </a:p>
+        </p:txBody>
+      </p:sp>
+      <p:sp>
+        <p:nvSpPr>
+          <p:cNvPr id="27" name="Pfeil: nach rechts 26"/>
+          <p:cNvSpPr/>
+          <p:nvPr/>
+        </p:nvSpPr>
+        <p:spPr>
+          <a:xfrm>
+            <a:off x="3199277" y="5140801"/>
+            <a:ext cx="1440000" cy="360000"/>
+          </a:xfrm>
+          <a:prstGeom prst="rightArrow">
+            <a:avLst/>
+          </a:prstGeom>
+        </p:spPr>
+        <p:style>
+          <a:lnRef idx="2">
+            <a:schemeClr val="accent1">
+              <a:shade val="50000"/>
+            </a:schemeClr>
+          </a:lnRef>
+          <a:fillRef idx="1">
+            <a:schemeClr val="accent1"/>
+          </a:fillRef>
+          <a:effectRef idx="0">
+            <a:schemeClr val="accent1"/>
+          </a:effectRef>
+          <a:fontRef idx="minor">
+            <a:schemeClr val="lt1"/>
+          </a:fontRef>
+        </p:style>
+        <p:txBody>
+          <a:bodyPr rtlCol="0" anchor="ctr"/>
+          <a:lstStyle/>
+          <a:p>
+            <a:pPr algn="ctr"/>
+            <a:endParaRPr lang="de-DE"/>
+          </a:p>
+        </p:txBody>
+      </p:sp>
+      <p:pic>
+        <p:nvPicPr>
+          <p:cNvPr id="5" name="Grafik 4"/>
+          <p:cNvPicPr>
+            <a:picLocks noChangeAspect="1"/>
+          </p:cNvPicPr>
+          <p:nvPr/>
+        </p:nvPicPr>
+        <p:blipFill>
+          <a:blip r:embed="rId2">
+            <a:extLst>
+              <a:ext uri="{28A0092B-C50C-407E-A947-70E740481C1C}">
+                <a14:useLocalDpi xmlns:a14="http://schemas.microsoft.com/office/drawing/2010/main" val="0"/>
+              </a:ext>
+            </a:extLst>
+          </a:blip>
+          <a:stretch>
+            <a:fillRect/>
+          </a:stretch>
+        </p:blipFill>
+        <p:spPr>
+          <a:xfrm>
+            <a:off x="609600" y="4240801"/>
+            <a:ext cx="2229677" cy="2160000"/>
+          </a:xfrm>
+          <a:prstGeom prst="rect">
+            <a:avLst/>
+          </a:prstGeom>
+        </p:spPr>
+      </p:pic>
+      <p:pic>
+        <p:nvPicPr>
+          <p:cNvPr id="26" name="Grafik 25"/>
+          <p:cNvPicPr>
+            <a:picLocks noChangeAspect="1"/>
+          </p:cNvPicPr>
+          <p:nvPr/>
+        </p:nvPicPr>
+        <p:blipFill>
+          <a:blip r:embed="rId3">
+            <a:extLst>
+              <a:ext uri="{28A0092B-C50C-407E-A947-70E740481C1C}">
+                <a14:useLocalDpi xmlns:a14="http://schemas.microsoft.com/office/drawing/2010/main" val="0"/>
+              </a:ext>
+            </a:extLst>
+          </a:blip>
+          <a:stretch>
+            <a:fillRect/>
+          </a:stretch>
+        </p:blipFill>
+        <p:spPr>
+          <a:xfrm>
+            <a:off x="609599" y="1775192"/>
+            <a:ext cx="2229678" cy="2160000"/>
+          </a:xfrm>
+          <a:prstGeom prst="rect">
+            <a:avLst/>
+          </a:prstGeom>
+        </p:spPr>
+      </p:pic>
+    </p:spTree>
+    <p:extLst>
+      <p:ext uri="{BB962C8B-B14F-4D97-AF65-F5344CB8AC3E}">
+        <p14:creationId xmlns:p14="http://schemas.microsoft.com/office/powerpoint/2010/main" val="2523785418"/>
+      </p:ext>
+    </p:extLst>
+  </p:cSld>
+  <p:clrMapOvr>
+    <a:masterClrMapping/>
+  </p:clrMapOvr>
+</p:sld>
+</file>
+
+<file path=ppt/slides/slide7.xml><?xml version="1.0" encoding="utf-8"?>
+<p:sld xmlns:a="http://schemas.openxmlformats.org/drawingml/2006/main" xmlns:r="http://schemas.openxmlformats.org/officeDocument/2006/relationships" xmlns:p="http://schemas.openxmlformats.org/presentationml/2006/main">
+  <p:cSld>
+    <p:spTree>
+      <p:nvGrpSpPr>
+        <p:cNvPr id="1" name=""/>
+        <p:cNvGrpSpPr/>
+        <p:nvPr/>
+      </p:nvGrpSpPr>
+      <p:grpSpPr>
+        <a:xfrm>
+          <a:off x="0" y="0"/>
+          <a:ext cx="0" cy="0"/>
+          <a:chOff x="0" y="0"/>
+          <a:chExt cx="0" cy="0"/>
+        </a:xfrm>
+      </p:grpSpPr>
+      <p:sp>
+        <p:nvSpPr>
+          <p:cNvPr id="27" name="Inhaltsplatzhalter 25"/>
+          <p:cNvSpPr>
+            <a:spLocks noGrp="1"/>
+          </p:cNvSpPr>
+          <p:nvPr>
+            <p:ph idx="1"/>
+          </p:nvPr>
+        </p:nvSpPr>
+        <p:spPr>
+          <a:xfrm>
+            <a:off x="609600" y="1775192"/>
+            <a:ext cx="10972800" cy="4625609"/>
+          </a:xfrm>
+        </p:spPr>
+        <p:txBody>
+          <a:bodyPr/>
+          <a:lstStyle/>
+          <a:p>
+            <a:endParaRPr lang="de-DE" dirty="0"/>
+          </a:p>
+        </p:txBody>
+      </p:sp>
+      <p:sp>
+        <p:nvSpPr>
+          <p:cNvPr id="2" name="Titel 1"/>
+          <p:cNvSpPr>
+            <a:spLocks noGrp="1"/>
+          </p:cNvSpPr>
+          <p:nvPr>
+            <p:ph type="title"/>
+          </p:nvPr>
+        </p:nvSpPr>
+        <p:spPr/>
+        <p:txBody>
+          <a:bodyPr/>
+          <a:lstStyle/>
+          <a:p>
+            <a:endParaRPr lang="de-DE"/>
+          </a:p>
+        </p:txBody>
+      </p:sp>
+    </p:spTree>
+    <p:extLst>
+      <p:ext uri="{BB962C8B-B14F-4D97-AF65-F5344CB8AC3E}">
+        <p14:creationId xmlns:p14="http://schemas.microsoft.com/office/powerpoint/2010/main" val="2907737980"/>
+      </p:ext>
+    </p:extLst>
+  </p:cSld>
+  <p:clrMapOvr>
+    <a:masterClrMapping/>
+  </p:clrMapOvr>
+</p:sld>
+</file>
+
 <file path=ppt/theme/theme1.xml><?xml version="1.0" encoding="utf-8"?>
 <a:theme xmlns:a="http://schemas.openxmlformats.org/drawingml/2006/main" name="Design1">
   <a:themeElements>

</xml_diff>

<commit_message>
Add images for output types
</commit_message>
<xml_diff>
--- a/docs/Anfangspräsentation.pptx
+++ b/docs/Anfangspräsentation.pptx
@@ -9127,7 +9127,7 @@
           <a:p>
             <a:pPr lvl="1"/>
             <a:r>
-              <a:rPr lang="de-DE"/>
+              <a:rPr lang="de-DE" dirty="0" err="1"/>
               <a:t>Haushöhe</a:t>
             </a:r>
             <a:endParaRPr lang="de-DE" dirty="0"/>
@@ -9160,6 +9160,54 @@
           </a:p>
         </p:txBody>
       </p:sp>
+      <p:pic>
+        <p:nvPicPr>
+          <p:cNvPr id="4" name="Grafik 3"/>
+          <p:cNvPicPr>
+            <a:picLocks noChangeAspect="1"/>
+          </p:cNvPicPr>
+          <p:nvPr/>
+        </p:nvPicPr>
+        <p:blipFill>
+          <a:blip r:embed="rId2"/>
+          <a:stretch>
+            <a:fillRect/>
+          </a:stretch>
+        </p:blipFill>
+        <p:spPr>
+          <a:xfrm>
+            <a:off x="9677134" y="1775192"/>
+            <a:ext cx="1905266" cy="1905266"/>
+          </a:xfrm>
+          <a:prstGeom prst="rect">
+            <a:avLst/>
+          </a:prstGeom>
+        </p:spPr>
+      </p:pic>
+      <p:pic>
+        <p:nvPicPr>
+          <p:cNvPr id="6" name="Grafik 5"/>
+          <p:cNvPicPr>
+            <a:picLocks noChangeAspect="1"/>
+          </p:cNvPicPr>
+          <p:nvPr/>
+        </p:nvPicPr>
+        <p:blipFill>
+          <a:blip r:embed="rId3"/>
+          <a:stretch>
+            <a:fillRect/>
+          </a:stretch>
+        </p:blipFill>
+        <p:spPr>
+          <a:xfrm>
+            <a:off x="9677134" y="4495535"/>
+            <a:ext cx="1905266" cy="1905266"/>
+          </a:xfrm>
+          <a:prstGeom prst="rect">
+            <a:avLst/>
+          </a:prstGeom>
+        </p:spPr>
+      </p:pic>
     </p:spTree>
     <p:extLst>
       <p:ext uri="{BB962C8B-B14F-4D97-AF65-F5344CB8AC3E}">

</xml_diff>